<commit_message>
Ajuste de mapa tema 4 mat 8
</commit_message>
<xml_diff>
--- a/fuentes/contenidos/grado08/guion04/MapaConceptual-tema 4 grado 8.pptx
+++ b/fuentes/contenidos/grado08/guion04/MapaConceptual-tema 4 grado 8.pptx
@@ -450,7 +450,7 @@
           <a:p>
             <a:fld id="{5001C876-01F7-4317-94B9-1AE222133113}" type="datetimeFigureOut">
               <a:rPr lang="es-ES" smtClean="0"/>
-              <a:t>03/08/2015</a:t>
+              <a:t>27/10/2015</a:t>
             </a:fld>
             <a:endParaRPr lang="es-ES"/>
           </a:p>
@@ -1061,10 +1061,16 @@
           <a:p>
             <a:pPr algn="ctr"/>
             <a:r>
-              <a:rPr lang="es-ES" sz="1600" dirty="0" smtClean="0"/>
-              <a:t>Factorización</a:t>
-            </a:r>
-            <a:endParaRPr lang="es-ES" sz="1600" dirty="0"/>
+              <a:rPr lang="es-ES" sz="1600" dirty="0" smtClean="0">
+                <a:latin typeface="Arial" panose="020B0604020202020204" pitchFamily="34" charset="0"/>
+                <a:cs typeface="Arial" panose="020B0604020202020204" pitchFamily="34" charset="0"/>
+              </a:rPr>
+              <a:t>La factorización</a:t>
+            </a:r>
+            <a:endParaRPr lang="es-ES" sz="1600" dirty="0">
+              <a:latin typeface="Arial" panose="020B0604020202020204" pitchFamily="34" charset="0"/>
+              <a:cs typeface="Arial" panose="020B0604020202020204" pitchFamily="34" charset="0"/>
+            </a:endParaRPr>
           </a:p>
         </p:txBody>
       </p:sp>
@@ -1076,7 +1082,7 @@
         </p:nvSpPr>
         <p:spPr>
           <a:xfrm>
-            <a:off x="4203149" y="1721898"/>
+            <a:off x="6446112" y="1554602"/>
             <a:ext cx="1124746" cy="439782"/>
           </a:xfrm>
           <a:prstGeom prst="rect">
@@ -1118,66 +1124,31 @@
           <a:p>
             <a:pPr algn="ctr"/>
             <a:r>
-              <a:rPr lang="es-ES" sz="1200" b="1" dirty="0" smtClean="0"/>
+              <a:rPr lang="es-ES" sz="800" b="1" dirty="0" smtClean="0">
+                <a:latin typeface="Arial" panose="020B0604020202020204" pitchFamily="34" charset="0"/>
+                <a:cs typeface="Arial" panose="020B0604020202020204" pitchFamily="34" charset="0"/>
+              </a:rPr>
               <a:t>Diferentes casos como</a:t>
             </a:r>
-            <a:endParaRPr lang="es-ES" sz="1200" b="1" dirty="0"/>
+            <a:endParaRPr lang="es-ES" sz="800" b="1" dirty="0">
+              <a:latin typeface="Arial" panose="020B0604020202020204" pitchFamily="34" charset="0"/>
+              <a:cs typeface="Arial" panose="020B0604020202020204" pitchFamily="34" charset="0"/>
+            </a:endParaRPr>
           </a:p>
         </p:txBody>
       </p:sp>
       <p:cxnSp>
         <p:nvCxnSpPr>
-          <p:cNvPr id="12" name="Conector angular 11"/>
-          <p:cNvCxnSpPr>
-            <a:stCxn id="335" idx="2"/>
-            <a:endCxn id="130" idx="0"/>
-          </p:cNvCxnSpPr>
-          <p:nvPr/>
-        </p:nvCxnSpPr>
-        <p:spPr>
-          <a:xfrm rot="16200000" flipH="1">
-            <a:off x="4702251" y="1342585"/>
-            <a:ext cx="111207" cy="8976"/>
-          </a:xfrm>
-          <a:prstGeom prst="bentConnector3">
-            <a:avLst>
-              <a:gd name="adj1" fmla="val 50000"/>
-            </a:avLst>
-          </a:prstGeom>
-          <a:ln w="12700">
-            <a:solidFill>
-              <a:schemeClr val="tx1"/>
-            </a:solidFill>
-          </a:ln>
-        </p:spPr>
-        <p:style>
-          <a:lnRef idx="1">
-            <a:schemeClr val="accent1"/>
-          </a:lnRef>
-          <a:fillRef idx="0">
-            <a:schemeClr val="accent1"/>
-          </a:fillRef>
-          <a:effectRef idx="0">
-            <a:schemeClr val="accent1"/>
-          </a:effectRef>
-          <a:fontRef idx="minor">
-            <a:schemeClr val="tx1"/>
-          </a:fontRef>
-        </p:style>
-      </p:cxnSp>
-      <p:cxnSp>
-        <p:nvCxnSpPr>
           <p:cNvPr id="31" name="Conector angular 30"/>
           <p:cNvCxnSpPr>
             <a:stCxn id="5" idx="2"/>
-            <a:endCxn id="44" idx="0"/>
           </p:cNvCxnSpPr>
           <p:nvPr/>
         </p:nvCxnSpPr>
         <p:spPr>
           <a:xfrm rot="5400000">
-            <a:off x="2397013" y="244295"/>
-            <a:ext cx="451125" cy="4285894"/>
+            <a:off x="6354102" y="1539467"/>
+            <a:ext cx="199466" cy="1109301"/>
           </a:xfrm>
           <a:prstGeom prst="bentConnector3">
             <a:avLst>
@@ -1213,7 +1184,7 @@
         </p:nvSpPr>
         <p:spPr>
           <a:xfrm>
-            <a:off x="51288" y="2612805"/>
+            <a:off x="1694931" y="973352"/>
             <a:ext cx="856680" cy="357473"/>
           </a:xfrm>
           <a:prstGeom prst="rect">
@@ -1250,17 +1221,21 @@
           <a:p>
             <a:pPr algn="ctr"/>
             <a:r>
-              <a:rPr lang="es-ES" sz="1050" dirty="0" smtClean="0">
+              <a:rPr lang="es-ES" sz="1000" dirty="0" smtClean="0">
                 <a:solidFill>
                   <a:schemeClr val="bg1"/>
                 </a:solidFill>
+                <a:latin typeface="Arial" panose="020B0604020202020204" pitchFamily="34" charset="0"/>
+                <a:cs typeface="Arial" panose="020B0604020202020204" pitchFamily="34" charset="0"/>
               </a:rPr>
               <a:t>Factor común</a:t>
             </a:r>
-            <a:endParaRPr lang="es-ES" sz="1050" dirty="0">
+            <a:endParaRPr lang="es-ES" sz="1000" dirty="0">
               <a:solidFill>
                 <a:schemeClr val="bg1"/>
               </a:solidFill>
+              <a:latin typeface="Arial" panose="020B0604020202020204" pitchFamily="34" charset="0"/>
+              <a:cs typeface="Arial" panose="020B0604020202020204" pitchFamily="34" charset="0"/>
             </a:endParaRPr>
           </a:p>
         </p:txBody>
@@ -1276,8 +1251,8 @@
         </p:nvCxnSpPr>
         <p:spPr>
           <a:xfrm rot="5400000">
-            <a:off x="4271377" y="2134515"/>
-            <a:ext cx="466980" cy="521311"/>
+            <a:off x="5076904" y="1116435"/>
+            <a:ext cx="1053633" cy="2809530"/>
           </a:xfrm>
           <a:prstGeom prst="bentConnector3">
             <a:avLst>
@@ -1313,7 +1288,7 @@
         </p:nvSpPr>
         <p:spPr>
           <a:xfrm>
-            <a:off x="-5569" y="3704038"/>
+            <a:off x="2570929" y="1174882"/>
             <a:ext cx="986869" cy="744180"/>
           </a:xfrm>
           <a:prstGeom prst="rect">
@@ -1350,17 +1325,21 @@
           <a:p>
             <a:pPr algn="ctr"/>
             <a:r>
-              <a:rPr lang="es-ES" sz="900" dirty="0" smtClean="0">
+              <a:rPr lang="es-ES" sz="1000" dirty="0" smtClean="0">
                 <a:solidFill>
                   <a:schemeClr val="tx1"/>
                 </a:solidFill>
+                <a:latin typeface="Arial" panose="020B0604020202020204" pitchFamily="34" charset="0"/>
+                <a:cs typeface="Arial" panose="020B0604020202020204" pitchFamily="34" charset="0"/>
               </a:rPr>
               <a:t>Todos los términos del polinomio tienen un elemento común</a:t>
             </a:r>
-            <a:endParaRPr lang="es-ES" sz="900" dirty="0">
+            <a:endParaRPr lang="es-ES" sz="1000" dirty="0">
               <a:solidFill>
                 <a:schemeClr val="tx1"/>
               </a:solidFill>
+              <a:latin typeface="Arial" panose="020B0604020202020204" pitchFamily="34" charset="0"/>
+              <a:cs typeface="Arial" panose="020B0604020202020204" pitchFamily="34" charset="0"/>
             </a:endParaRPr>
           </a:p>
         </p:txBody>
@@ -1408,61 +1387,102 @@
           <a:p>
             <a:pPr algn="ctr"/>
             <a:r>
-              <a:rPr lang="es-ES_tradnl" sz="900" dirty="0"/>
+              <a:rPr lang="es-ES_tradnl" sz="1000" dirty="0">
+                <a:latin typeface="Arial" panose="020B0604020202020204" pitchFamily="34" charset="0"/>
+                <a:cs typeface="Arial" panose="020B0604020202020204" pitchFamily="34" charset="0"/>
+              </a:rPr>
               <a:t>12</a:t>
             </a:r>
             <a:r>
-              <a:rPr lang="es-ES_tradnl" sz="900" i="1" dirty="0"/>
+              <a:rPr lang="es-ES_tradnl" sz="1000" i="1" dirty="0">
+                <a:latin typeface="Arial" panose="020B0604020202020204" pitchFamily="34" charset="0"/>
+                <a:cs typeface="Arial" panose="020B0604020202020204" pitchFamily="34" charset="0"/>
+              </a:rPr>
               <a:t>x</a:t>
             </a:r>
             <a:r>
-              <a:rPr lang="es-ES_tradnl" sz="900" i="1" baseline="30000" dirty="0"/>
+              <a:rPr lang="es-ES_tradnl" sz="1000" i="1" baseline="30000" dirty="0">
+                <a:latin typeface="Arial" panose="020B0604020202020204" pitchFamily="34" charset="0"/>
+                <a:cs typeface="Arial" panose="020B0604020202020204" pitchFamily="34" charset="0"/>
+              </a:rPr>
               <a:t>3</a:t>
             </a:r>
             <a:r>
-              <a:rPr lang="es-ES_tradnl" sz="900" i="1" dirty="0"/>
+              <a:rPr lang="es-ES_tradnl" sz="1000" i="1" dirty="0">
+                <a:latin typeface="Arial" panose="020B0604020202020204" pitchFamily="34" charset="0"/>
+                <a:cs typeface="Arial" panose="020B0604020202020204" pitchFamily="34" charset="0"/>
+              </a:rPr>
               <a:t>z</a:t>
             </a:r>
             <a:r>
-              <a:rPr lang="es-ES_tradnl" sz="900" dirty="0"/>
+              <a:rPr lang="es-ES_tradnl" sz="1000" dirty="0">
+                <a:latin typeface="Arial" panose="020B0604020202020204" pitchFamily="34" charset="0"/>
+                <a:cs typeface="Arial" panose="020B0604020202020204" pitchFamily="34" charset="0"/>
+              </a:rPr>
               <a:t>; </a:t>
             </a:r>
             <a:r>
-              <a:rPr lang="es-ES_tradnl" sz="900" dirty="0" smtClean="0"/>
+              <a:rPr lang="es-ES_tradnl" sz="1000" dirty="0" smtClean="0">
+                <a:latin typeface="Arial" panose="020B0604020202020204" pitchFamily="34" charset="0"/>
+                <a:cs typeface="Arial" panose="020B0604020202020204" pitchFamily="34" charset="0"/>
+              </a:rPr>
               <a:t>9</a:t>
             </a:r>
             <a:r>
-              <a:rPr lang="es-ES_tradnl" sz="900" i="1" dirty="0" smtClean="0"/>
+              <a:rPr lang="es-ES_tradnl" sz="1000" i="1" dirty="0" smtClean="0">
+                <a:latin typeface="Arial" panose="020B0604020202020204" pitchFamily="34" charset="0"/>
+                <a:cs typeface="Arial" panose="020B0604020202020204" pitchFamily="34" charset="0"/>
+              </a:rPr>
               <a:t>x</a:t>
             </a:r>
             <a:r>
-              <a:rPr lang="es-ES_tradnl" sz="900" i="1" baseline="30000" dirty="0" smtClean="0"/>
+              <a:rPr lang="es-ES_tradnl" sz="1000" i="1" baseline="30000" dirty="0" smtClean="0">
+                <a:latin typeface="Arial" panose="020B0604020202020204" pitchFamily="34" charset="0"/>
+                <a:cs typeface="Arial" panose="020B0604020202020204" pitchFamily="34" charset="0"/>
+              </a:rPr>
               <a:t>5</a:t>
             </a:r>
             <a:r>
-              <a:rPr lang="es-ES_tradnl" sz="900" i="1" dirty="0" smtClean="0"/>
+              <a:rPr lang="es-ES_tradnl" sz="1000" i="1" dirty="0" smtClean="0">
+                <a:latin typeface="Arial" panose="020B0604020202020204" pitchFamily="34" charset="0"/>
+                <a:cs typeface="Arial" panose="020B0604020202020204" pitchFamily="34" charset="0"/>
+              </a:rPr>
               <a:t>y </a:t>
             </a:r>
             <a:r>
-              <a:rPr lang="es-ES_tradnl" sz="900" dirty="0" smtClean="0"/>
+              <a:rPr lang="es-ES_tradnl" sz="1000" dirty="0" smtClean="0">
+                <a:latin typeface="Arial" panose="020B0604020202020204" pitchFamily="34" charset="0"/>
+                <a:cs typeface="Arial" panose="020B0604020202020204" pitchFamily="34" charset="0"/>
+              </a:rPr>
               <a:t> tienen como factor común a </a:t>
             </a:r>
             <a:r>
-              <a:rPr lang="es-ES_tradnl" sz="900" dirty="0"/>
+              <a:rPr lang="es-ES_tradnl" sz="1000" dirty="0">
+                <a:latin typeface="Arial" panose="020B0604020202020204" pitchFamily="34" charset="0"/>
+                <a:cs typeface="Arial" panose="020B0604020202020204" pitchFamily="34" charset="0"/>
+              </a:rPr>
               <a:t>3</a:t>
             </a:r>
             <a:r>
-              <a:rPr lang="es-ES_tradnl" sz="900" i="1" dirty="0"/>
+              <a:rPr lang="es-ES_tradnl" sz="1000" i="1" dirty="0">
+                <a:latin typeface="Arial" panose="020B0604020202020204" pitchFamily="34" charset="0"/>
+                <a:cs typeface="Arial" panose="020B0604020202020204" pitchFamily="34" charset="0"/>
+              </a:rPr>
               <a:t>x</a:t>
             </a:r>
             <a:r>
-              <a:rPr lang="es-ES_tradnl" sz="900" baseline="30000" dirty="0"/>
+              <a:rPr lang="es-ES_tradnl" sz="1000" baseline="30000" dirty="0">
+                <a:latin typeface="Arial" panose="020B0604020202020204" pitchFamily="34" charset="0"/>
+                <a:cs typeface="Arial" panose="020B0604020202020204" pitchFamily="34" charset="0"/>
+              </a:rPr>
               <a:t>3</a:t>
             </a:r>
-            <a:endParaRPr lang="es-ES" sz="900" dirty="0">
+            <a:endParaRPr lang="es-ES" sz="1000" dirty="0">
               <a:solidFill>
                 <a:schemeClr val="tx1"/>
               </a:solidFill>
+              <a:latin typeface="Arial" panose="020B0604020202020204" pitchFamily="34" charset="0"/>
+              <a:cs typeface="Arial" panose="020B0604020202020204" pitchFamily="34" charset="0"/>
             </a:endParaRPr>
           </a:p>
         </p:txBody>
@@ -1476,7 +1496,7 @@
         <p:spPr>
           <a:xfrm>
             <a:off x="-90618" y="4952377"/>
-            <a:ext cx="1117174" cy="230832"/>
+            <a:ext cx="1117174" cy="246221"/>
           </a:xfrm>
           <a:prstGeom prst="rect">
             <a:avLst/>
@@ -1491,26 +1511,29 @@
           <a:p>
             <a:pPr algn="ctr"/>
             <a:r>
-              <a:rPr lang="es-ES" sz="900" dirty="0" smtClean="0"/>
+              <a:rPr lang="es-ES" sz="1000" dirty="0" smtClean="0">
+                <a:latin typeface="Arial" panose="020B0604020202020204" pitchFamily="34" charset="0"/>
+                <a:cs typeface="Arial" panose="020B0604020202020204" pitchFamily="34" charset="0"/>
+              </a:rPr>
               <a:t>ejemplo</a:t>
             </a:r>
-            <a:endParaRPr lang="es-ES" sz="900" dirty="0"/>
+            <a:endParaRPr lang="es-ES" sz="1000" dirty="0">
+              <a:latin typeface="Arial" panose="020B0604020202020204" pitchFamily="34" charset="0"/>
+              <a:cs typeface="Arial" panose="020B0604020202020204" pitchFamily="34" charset="0"/>
+            </a:endParaRPr>
           </a:p>
         </p:txBody>
       </p:sp>
       <p:cxnSp>
         <p:nvCxnSpPr>
-          <p:cNvPr id="76" name="Conector angular 75"/>
-          <p:cNvCxnSpPr>
-            <a:stCxn id="44" idx="2"/>
-            <a:endCxn id="72" idx="0"/>
-          </p:cNvCxnSpPr>
+          <p:cNvPr id="79" name="Conector angular 78"/>
+          <p:cNvCxnSpPr/>
           <p:nvPr/>
         </p:nvCxnSpPr>
         <p:spPr>
-          <a:xfrm rot="16200000" flipH="1">
-            <a:off x="116867" y="3333039"/>
-            <a:ext cx="733760" cy="8238"/>
+          <a:xfrm rot="5400000">
+            <a:off x="180583" y="5109706"/>
+            <a:ext cx="504159" cy="19897"/>
           </a:xfrm>
           <a:prstGeom prst="bentConnector3">
             <a:avLst>
@@ -1540,57 +1563,14 @@
       </p:cxnSp>
       <p:cxnSp>
         <p:nvCxnSpPr>
-          <p:cNvPr id="79" name="Conector angular 78"/>
-          <p:cNvCxnSpPr>
-            <a:stCxn id="72" idx="2"/>
-            <a:endCxn id="75" idx="0"/>
-          </p:cNvCxnSpPr>
+          <p:cNvPr id="82" name="Conector angular 81"/>
+          <p:cNvCxnSpPr/>
           <p:nvPr/>
         </p:nvCxnSpPr>
         <p:spPr>
-          <a:xfrm rot="5400000">
-            <a:off x="225839" y="4690349"/>
-            <a:ext cx="504159" cy="19897"/>
-          </a:xfrm>
-          <a:prstGeom prst="bentConnector3">
-            <a:avLst>
-              <a:gd name="adj1" fmla="val 50000"/>
-            </a:avLst>
-          </a:prstGeom>
-          <a:ln w="12700">
-            <a:solidFill>
-              <a:schemeClr val="tx1"/>
-            </a:solidFill>
-          </a:ln>
-        </p:spPr>
-        <p:style>
-          <a:lnRef idx="1">
-            <a:schemeClr val="accent1"/>
-          </a:lnRef>
-          <a:fillRef idx="0">
-            <a:schemeClr val="accent1"/>
-          </a:fillRef>
-          <a:effectRef idx="0">
-            <a:schemeClr val="accent1"/>
-          </a:effectRef>
-          <a:fontRef idx="minor">
-            <a:schemeClr val="tx1"/>
-          </a:fontRef>
-        </p:style>
-      </p:cxnSp>
-      <p:cxnSp>
-        <p:nvCxnSpPr>
-          <p:cNvPr id="82" name="Conector angular 81"/>
-          <p:cNvCxnSpPr>
-            <a:stCxn id="75" idx="2"/>
-            <a:endCxn id="73" idx="0"/>
-          </p:cNvCxnSpPr>
-          <p:nvPr/>
-        </p:nvCxnSpPr>
-        <p:spPr>
           <a:xfrm rot="16200000" flipH="1">
-            <a:off x="369912" y="5281265"/>
-            <a:ext cx="198735" cy="2621"/>
+            <a:off x="332350" y="5708317"/>
+            <a:ext cx="183346" cy="2621"/>
           </a:xfrm>
           <a:prstGeom prst="bentConnector3">
             <a:avLst>
@@ -1627,7 +1607,7 @@
         <p:spPr>
           <a:xfrm>
             <a:off x="4201126" y="1402677"/>
-            <a:ext cx="1122431" cy="230832"/>
+            <a:ext cx="1122431" cy="246221"/>
           </a:xfrm>
           <a:prstGeom prst="rect">
             <a:avLst/>
@@ -1642,30 +1622,33 @@
           <a:p>
             <a:pPr algn="ctr"/>
             <a:r>
-              <a:rPr lang="es-ES" sz="900" dirty="0" smtClean="0"/>
+              <a:rPr lang="es-ES" sz="1000" dirty="0" smtClean="0">
+                <a:latin typeface="Arial" panose="020B0604020202020204" pitchFamily="34" charset="0"/>
+                <a:cs typeface="Arial" panose="020B0604020202020204" pitchFamily="34" charset="0"/>
+              </a:rPr>
               <a:t>existen</a:t>
             </a:r>
-            <a:endParaRPr lang="es-ES" sz="900" dirty="0"/>
+            <a:endParaRPr lang="es-ES" sz="1000" dirty="0">
+              <a:latin typeface="Arial" panose="020B0604020202020204" pitchFamily="34" charset="0"/>
+              <a:cs typeface="Arial" panose="020B0604020202020204" pitchFamily="34" charset="0"/>
+            </a:endParaRPr>
           </a:p>
         </p:txBody>
       </p:sp>
       <p:cxnSp>
         <p:nvCxnSpPr>
           <p:cNvPr id="132" name="Conector angular 131"/>
-          <p:cNvCxnSpPr>
-            <a:stCxn id="130" idx="2"/>
-            <a:endCxn id="5" idx="0"/>
-          </p:cNvCxnSpPr>
+          <p:cNvCxnSpPr/>
           <p:nvPr/>
         </p:nvCxnSpPr>
         <p:spPr>
-          <a:xfrm rot="16200000" flipH="1">
-            <a:off x="4719738" y="1676113"/>
-            <a:ext cx="88389" cy="3180"/>
+          <a:xfrm flipV="1">
+            <a:off x="1263623" y="2139437"/>
+            <a:ext cx="3261403" cy="205359"/>
           </a:xfrm>
           <a:prstGeom prst="bentConnector3">
             <a:avLst>
-              <a:gd name="adj1" fmla="val 50000"/>
+              <a:gd name="adj1" fmla="val -525"/>
             </a:avLst>
           </a:prstGeom>
           <a:ln w="12700">
@@ -1697,7 +1680,7 @@
         </p:nvSpPr>
         <p:spPr>
           <a:xfrm>
-            <a:off x="1121935" y="2594546"/>
+            <a:off x="1386009" y="1640703"/>
             <a:ext cx="1051444" cy="461139"/>
           </a:xfrm>
           <a:prstGeom prst="rect">
@@ -1734,17 +1717,21 @@
           <a:p>
             <a:pPr algn="ctr"/>
             <a:r>
-              <a:rPr lang="es-ES" sz="1050" dirty="0" smtClean="0">
+              <a:rPr lang="es-ES" sz="800" dirty="0" smtClean="0">
                 <a:solidFill>
                   <a:schemeClr val="bg1"/>
                 </a:solidFill>
+                <a:latin typeface="Arial" panose="020B0604020202020204" pitchFamily="34" charset="0"/>
+                <a:cs typeface="Arial" panose="020B0604020202020204" pitchFamily="34" charset="0"/>
               </a:rPr>
               <a:t>Factor común por agrupación de términos</a:t>
             </a:r>
-            <a:endParaRPr lang="es-ES" sz="1050" dirty="0">
+            <a:endParaRPr lang="es-ES" sz="800" dirty="0">
               <a:solidFill>
                 <a:schemeClr val="bg1"/>
               </a:solidFill>
+              <a:latin typeface="Arial" panose="020B0604020202020204" pitchFamily="34" charset="0"/>
+              <a:cs typeface="Arial" panose="020B0604020202020204" pitchFamily="34" charset="0"/>
             </a:endParaRPr>
           </a:p>
         </p:txBody>
@@ -1759,13 +1746,15 @@
           <p:nvPr/>
         </p:nvCxnSpPr>
         <p:spPr>
-          <a:xfrm rot="5400000">
-            <a:off x="2990157" y="819181"/>
-            <a:ext cx="432866" cy="3117865"/>
-          </a:xfrm>
-          <a:prstGeom prst="bentConnector3">
+          <a:xfrm rot="5400000" flipH="1">
+            <a:off x="4283267" y="-730833"/>
+            <a:ext cx="353681" cy="5096754"/>
+          </a:xfrm>
+          <a:prstGeom prst="bentConnector5">
             <a:avLst>
-              <a:gd name="adj1" fmla="val 50000"/>
+              <a:gd name="adj1" fmla="val -64635"/>
+              <a:gd name="adj2" fmla="val 50360"/>
+              <a:gd name="adj3" fmla="val 164635"/>
             </a:avLst>
           </a:prstGeom>
           <a:ln w="12700">
@@ -1797,7 +1786,7 @@
         </p:nvSpPr>
         <p:spPr>
           <a:xfrm>
-            <a:off x="1121104" y="3728192"/>
+            <a:off x="1075848" y="4147549"/>
             <a:ext cx="1047423" cy="696166"/>
           </a:xfrm>
           <a:prstGeom prst="rect">
@@ -1834,17 +1823,21 @@
           <a:p>
             <a:pPr algn="ctr"/>
             <a:r>
-              <a:rPr lang="es-ES" sz="900" dirty="0" smtClean="0">
+              <a:rPr lang="es-ES" sz="800" dirty="0" smtClean="0">
                 <a:solidFill>
                   <a:schemeClr val="tx1"/>
                 </a:solidFill>
+                <a:latin typeface="Arial" panose="020B0604020202020204" pitchFamily="34" charset="0"/>
+                <a:cs typeface="Arial" panose="020B0604020202020204" pitchFamily="34" charset="0"/>
               </a:rPr>
               <a:t>NO todos los términos del polinomio tienen un elemento común.</a:t>
             </a:r>
-            <a:endParaRPr lang="es-ES" sz="900" dirty="0">
+            <a:endParaRPr lang="es-ES" sz="800" dirty="0">
               <a:solidFill>
                 <a:schemeClr val="tx1"/>
               </a:solidFill>
+              <a:latin typeface="Arial" panose="020B0604020202020204" pitchFamily="34" charset="0"/>
+              <a:cs typeface="Arial" panose="020B0604020202020204" pitchFamily="34" charset="0"/>
             </a:endParaRPr>
           </a:p>
         </p:txBody>
@@ -1857,7 +1850,7 @@
         </p:nvSpPr>
         <p:spPr>
           <a:xfrm>
-            <a:off x="1179127" y="5381944"/>
+            <a:off x="1133871" y="5801301"/>
             <a:ext cx="934809" cy="353519"/>
           </a:xfrm>
           <a:prstGeom prst="rect">
@@ -1891,53 +1884,92 @@
           <a:lstStyle/>
           <a:p>
             <a:r>
-              <a:rPr lang="es-ES_tradnl" sz="900" dirty="0"/>
+              <a:rPr lang="es-ES_tradnl" sz="800" dirty="0">
+                <a:latin typeface="Arial" panose="020B0604020202020204" pitchFamily="34" charset="0"/>
+                <a:cs typeface="Arial" panose="020B0604020202020204" pitchFamily="34" charset="0"/>
+              </a:rPr>
               <a:t>9</a:t>
             </a:r>
             <a:r>
-              <a:rPr lang="es-ES_tradnl" sz="900" i="1" dirty="0"/>
+              <a:rPr lang="es-ES_tradnl" sz="800" i="1" dirty="0">
+                <a:latin typeface="Arial" panose="020B0604020202020204" pitchFamily="34" charset="0"/>
+                <a:cs typeface="Arial" panose="020B0604020202020204" pitchFamily="34" charset="0"/>
+              </a:rPr>
               <a:t>x +</a:t>
             </a:r>
             <a:r>
-              <a:rPr lang="es-ES_tradnl" sz="900" dirty="0"/>
+              <a:rPr lang="es-ES_tradnl" sz="800" dirty="0">
+                <a:latin typeface="Arial" panose="020B0604020202020204" pitchFamily="34" charset="0"/>
+                <a:cs typeface="Arial" panose="020B0604020202020204" pitchFamily="34" charset="0"/>
+              </a:rPr>
               <a:t> 3</a:t>
             </a:r>
             <a:r>
-              <a:rPr lang="es-ES_tradnl" sz="900" i="1" dirty="0"/>
+              <a:rPr lang="es-ES_tradnl" sz="800" i="1" dirty="0">
+                <a:latin typeface="Arial" panose="020B0604020202020204" pitchFamily="34" charset="0"/>
+                <a:cs typeface="Arial" panose="020B0604020202020204" pitchFamily="34" charset="0"/>
+              </a:rPr>
               <a:t>nx + </a:t>
             </a:r>
             <a:r>
-              <a:rPr lang="es-ES_tradnl" sz="900" dirty="0"/>
+              <a:rPr lang="es-ES_tradnl" sz="800" dirty="0">
+                <a:latin typeface="Arial" panose="020B0604020202020204" pitchFamily="34" charset="0"/>
+                <a:cs typeface="Arial" panose="020B0604020202020204" pitchFamily="34" charset="0"/>
+              </a:rPr>
               <a:t>3</a:t>
             </a:r>
             <a:r>
-              <a:rPr lang="es-ES_tradnl" sz="900" i="1" dirty="0"/>
+              <a:rPr lang="es-ES_tradnl" sz="800" i="1" dirty="0">
+                <a:latin typeface="Arial" panose="020B0604020202020204" pitchFamily="34" charset="0"/>
+                <a:cs typeface="Arial" panose="020B0604020202020204" pitchFamily="34" charset="0"/>
+              </a:rPr>
               <a:t>ky = </a:t>
             </a:r>
-            <a:endParaRPr lang="es-ES_tradnl" sz="900" i="1" dirty="0" smtClean="0"/>
+            <a:endParaRPr lang="es-ES_tradnl" sz="800" i="1" dirty="0" smtClean="0">
+              <a:latin typeface="Arial" panose="020B0604020202020204" pitchFamily="34" charset="0"/>
+              <a:cs typeface="Arial" panose="020B0604020202020204" pitchFamily="34" charset="0"/>
+            </a:endParaRPr>
           </a:p>
           <a:p>
             <a:r>
-              <a:rPr lang="es-ES_tradnl" sz="900" dirty="0" smtClean="0"/>
+              <a:rPr lang="es-ES_tradnl" sz="800" dirty="0" smtClean="0">
+                <a:latin typeface="Arial" panose="020B0604020202020204" pitchFamily="34" charset="0"/>
+                <a:cs typeface="Arial" panose="020B0604020202020204" pitchFamily="34" charset="0"/>
+              </a:rPr>
               <a:t>3</a:t>
             </a:r>
             <a:r>
-              <a:rPr lang="es-ES_tradnl" sz="900" i="1" dirty="0" smtClean="0"/>
+              <a:rPr lang="es-ES_tradnl" sz="800" i="1" dirty="0" smtClean="0">
+                <a:latin typeface="Arial" panose="020B0604020202020204" pitchFamily="34" charset="0"/>
+                <a:cs typeface="Arial" panose="020B0604020202020204" pitchFamily="34" charset="0"/>
+              </a:rPr>
               <a:t>x</a:t>
             </a:r>
             <a:r>
-              <a:rPr lang="es-ES_tradnl" sz="900" dirty="0" smtClean="0"/>
+              <a:rPr lang="es-ES_tradnl" sz="800" dirty="0" smtClean="0">
+                <a:latin typeface="Arial" panose="020B0604020202020204" pitchFamily="34" charset="0"/>
+                <a:cs typeface="Arial" panose="020B0604020202020204" pitchFamily="34" charset="0"/>
+              </a:rPr>
               <a:t> (3 + </a:t>
             </a:r>
             <a:r>
-              <a:rPr lang="es-ES_tradnl" sz="900" i="1" dirty="0" smtClean="0"/>
+              <a:rPr lang="es-ES_tradnl" sz="800" i="1" dirty="0" smtClean="0">
+                <a:latin typeface="Arial" panose="020B0604020202020204" pitchFamily="34" charset="0"/>
+                <a:cs typeface="Arial" panose="020B0604020202020204" pitchFamily="34" charset="0"/>
+              </a:rPr>
               <a:t>n + k</a:t>
             </a:r>
             <a:r>
-              <a:rPr lang="es-ES_tradnl" sz="900" dirty="0" smtClean="0"/>
+              <a:rPr lang="es-ES_tradnl" sz="800" dirty="0" smtClean="0">
+                <a:latin typeface="Arial" panose="020B0604020202020204" pitchFamily="34" charset="0"/>
+                <a:cs typeface="Arial" panose="020B0604020202020204" pitchFamily="34" charset="0"/>
+              </a:rPr>
               <a:t>)</a:t>
             </a:r>
-            <a:endParaRPr lang="es-CO" sz="900" dirty="0"/>
+            <a:endParaRPr lang="es-CO" sz="800" dirty="0">
+              <a:latin typeface="Arial" panose="020B0604020202020204" pitchFamily="34" charset="0"/>
+              <a:cs typeface="Arial" panose="020B0604020202020204" pitchFamily="34" charset="0"/>
+            </a:endParaRPr>
           </a:p>
         </p:txBody>
       </p:sp>
@@ -1949,8 +1981,8 @@
         </p:nvSpPr>
         <p:spPr>
           <a:xfrm>
-            <a:off x="1082024" y="4998461"/>
-            <a:ext cx="1117174" cy="230832"/>
+            <a:off x="1036768" y="5417818"/>
+            <a:ext cx="1117174" cy="215444"/>
           </a:xfrm>
           <a:prstGeom prst="rect">
             <a:avLst/>
@@ -1965,53 +1997,19 @@
           <a:p>
             <a:pPr algn="ctr"/>
             <a:r>
-              <a:rPr lang="es-ES" sz="900" dirty="0" smtClean="0"/>
+              <a:rPr lang="es-ES" sz="800" dirty="0" smtClean="0">
+                <a:latin typeface="Arial" panose="020B0604020202020204" pitchFamily="34" charset="0"/>
+                <a:cs typeface="Arial" panose="020B0604020202020204" pitchFamily="34" charset="0"/>
+              </a:rPr>
               <a:t>ejemplo</a:t>
             </a:r>
-            <a:endParaRPr lang="es-ES" sz="900" dirty="0"/>
+            <a:endParaRPr lang="es-ES" sz="800" dirty="0">
+              <a:latin typeface="Arial" panose="020B0604020202020204" pitchFamily="34" charset="0"/>
+              <a:cs typeface="Arial" panose="020B0604020202020204" pitchFamily="34" charset="0"/>
+            </a:endParaRPr>
           </a:p>
         </p:txBody>
       </p:sp>
-      <p:cxnSp>
-        <p:nvCxnSpPr>
-          <p:cNvPr id="260" name="Conector angular 259"/>
-          <p:cNvCxnSpPr>
-            <a:stCxn id="220" idx="2"/>
-            <a:endCxn id="256" idx="0"/>
-          </p:cNvCxnSpPr>
-          <p:nvPr/>
-        </p:nvCxnSpPr>
-        <p:spPr>
-          <a:xfrm rot="5400000">
-            <a:off x="1309984" y="3390518"/>
-            <a:ext cx="672507" cy="2841"/>
-          </a:xfrm>
-          <a:prstGeom prst="bentConnector3">
-            <a:avLst>
-              <a:gd name="adj1" fmla="val 50000"/>
-            </a:avLst>
-          </a:prstGeom>
-          <a:ln w="12700">
-            <a:solidFill>
-              <a:schemeClr val="tx1"/>
-            </a:solidFill>
-          </a:ln>
-        </p:spPr>
-        <p:style>
-          <a:lnRef idx="1">
-            <a:schemeClr val="accent1"/>
-          </a:lnRef>
-          <a:fillRef idx="0">
-            <a:schemeClr val="accent1"/>
-          </a:fillRef>
-          <a:effectRef idx="0">
-            <a:schemeClr val="accent1"/>
-          </a:effectRef>
-          <a:fontRef idx="minor">
-            <a:schemeClr val="tx1"/>
-          </a:fontRef>
-        </p:style>
-      </p:cxnSp>
       <p:cxnSp>
         <p:nvCxnSpPr>
           <p:cNvPr id="261" name="Conector angular 260"/>
@@ -2023,7 +2021,7 @@
         </p:nvCxnSpPr>
         <p:spPr>
           <a:xfrm rot="5400000">
-            <a:off x="1355663" y="4709307"/>
+            <a:off x="1310407" y="5128664"/>
             <a:ext cx="574103" cy="4205"/>
           </a:xfrm>
           <a:prstGeom prst="bentConnector3">
@@ -2063,8 +2061,8 @@
         </p:nvCxnSpPr>
         <p:spPr>
           <a:xfrm rot="16200000" flipH="1">
-            <a:off x="1567246" y="5302657"/>
-            <a:ext cx="152651" cy="5921"/>
+            <a:off x="1514296" y="5714320"/>
+            <a:ext cx="168039" cy="5921"/>
           </a:xfrm>
           <a:prstGeom prst="bentConnector3">
             <a:avLst>
@@ -2100,7 +2098,7 @@
         </p:nvSpPr>
         <p:spPr>
           <a:xfrm>
-            <a:off x="2375772" y="2593782"/>
+            <a:off x="2330516" y="3013139"/>
             <a:ext cx="977438" cy="357473"/>
           </a:xfrm>
           <a:prstGeom prst="rect">
@@ -2137,17 +2135,21 @@
           <a:p>
             <a:pPr algn="ctr"/>
             <a:r>
-              <a:rPr lang="es-ES" sz="1050" dirty="0" smtClean="0">
+              <a:rPr lang="es-ES" sz="800" dirty="0" smtClean="0">
                 <a:solidFill>
                   <a:schemeClr val="bg1"/>
                 </a:solidFill>
+                <a:latin typeface="Arial" panose="020B0604020202020204" pitchFamily="34" charset="0"/>
+                <a:cs typeface="Arial" panose="020B0604020202020204" pitchFamily="34" charset="0"/>
               </a:rPr>
               <a:t>Diferencia de cuadrados</a:t>
             </a:r>
-            <a:endParaRPr lang="es-ES" sz="1050" dirty="0">
+            <a:endParaRPr lang="es-ES" sz="800" dirty="0">
               <a:solidFill>
                 <a:schemeClr val="bg1"/>
               </a:solidFill>
+              <a:latin typeface="Arial" panose="020B0604020202020204" pitchFamily="34" charset="0"/>
+              <a:cs typeface="Arial" panose="020B0604020202020204" pitchFamily="34" charset="0"/>
             </a:endParaRPr>
           </a:p>
         </p:txBody>
@@ -2163,8 +2165,8 @@
         </p:nvCxnSpPr>
         <p:spPr>
           <a:xfrm rot="5400000">
-            <a:off x="3598956" y="1427216"/>
-            <a:ext cx="432102" cy="1901031"/>
+            <a:off x="4404483" y="409136"/>
+            <a:ext cx="1018755" cy="4189250"/>
           </a:xfrm>
           <a:prstGeom prst="bentConnector3">
             <a:avLst>
@@ -2203,7 +2205,7 @@
         </p:nvCxnSpPr>
         <p:spPr>
           <a:xfrm rot="5400000">
-            <a:off x="4015417" y="3621037"/>
+            <a:off x="3970161" y="4040394"/>
             <a:ext cx="1860984" cy="557866"/>
           </a:xfrm>
           <a:prstGeom prst="bentConnector3">
@@ -2240,7 +2242,7 @@
         </p:nvSpPr>
         <p:spPr>
           <a:xfrm>
-            <a:off x="2905773" y="4812064"/>
+            <a:off x="2860517" y="5231421"/>
             <a:ext cx="1122431" cy="343441"/>
           </a:xfrm>
           <a:prstGeom prst="rect">
@@ -2277,17 +2279,21 @@
           <a:p>
             <a:pPr algn="ctr"/>
             <a:r>
-              <a:rPr lang="es-ES" sz="900" dirty="0" smtClean="0">
+              <a:rPr lang="es-ES" sz="800" dirty="0" smtClean="0">
                 <a:solidFill>
                   <a:schemeClr val="tx1"/>
                 </a:solidFill>
+                <a:latin typeface="Arial" panose="020B0604020202020204" pitchFamily="34" charset="0"/>
+                <a:cs typeface="Arial" panose="020B0604020202020204" pitchFamily="34" charset="0"/>
               </a:rPr>
               <a:t>Trinomio cuadrado perfecto</a:t>
             </a:r>
-            <a:endParaRPr lang="es-ES" sz="900" dirty="0">
+            <a:endParaRPr lang="es-ES" sz="800" dirty="0">
               <a:solidFill>
                 <a:schemeClr val="tx1"/>
               </a:solidFill>
+              <a:latin typeface="Arial" panose="020B0604020202020204" pitchFamily="34" charset="0"/>
+              <a:cs typeface="Arial" panose="020B0604020202020204" pitchFamily="34" charset="0"/>
             </a:endParaRPr>
           </a:p>
         </p:txBody>
@@ -2303,7 +2309,7 @@
         </p:nvCxnSpPr>
         <p:spPr>
           <a:xfrm rot="5400000">
-            <a:off x="3424623" y="3011845"/>
+            <a:off x="3379367" y="3431202"/>
             <a:ext cx="1842586" cy="1757853"/>
           </a:xfrm>
           <a:prstGeom prst="bentConnector3">
@@ -2340,8 +2346,8 @@
         </p:nvSpPr>
         <p:spPr>
           <a:xfrm>
-            <a:off x="3890172" y="771212"/>
-            <a:ext cx="1726387" cy="520258"/>
+            <a:off x="3902121" y="881636"/>
+            <a:ext cx="1997064" cy="753318"/>
           </a:xfrm>
           <a:prstGeom prst="rect">
             <a:avLst/>
@@ -2382,10 +2388,23 @@
           <a:p>
             <a:pPr algn="ctr"/>
             <a:r>
-              <a:rPr lang="es-ES" sz="1200" b="1" dirty="0" smtClean="0"/>
-              <a:t>Escribir una expresión o un número en términos de una multiplicación.</a:t>
-            </a:r>
-            <a:endParaRPr lang="es-ES" sz="1200" b="1" dirty="0"/>
+              <a:rPr lang="es-ES" sz="1200" dirty="0" smtClean="0">
+                <a:latin typeface="Arial" panose="020B0604020202020204" pitchFamily="34" charset="0"/>
+                <a:cs typeface="Arial" panose="020B0604020202020204" pitchFamily="34" charset="0"/>
+              </a:rPr>
+              <a:t>Escribir una expresión </a:t>
+            </a:r>
+            <a:r>
+              <a:rPr lang="es-ES" sz="1200" dirty="0" smtClean="0">
+                <a:latin typeface="Arial" panose="020B0604020202020204" pitchFamily="34" charset="0"/>
+                <a:cs typeface="Arial" panose="020B0604020202020204" pitchFamily="34" charset="0"/>
+              </a:rPr>
+              <a:t>algebraica como un producto de dos o más expresiones</a:t>
+            </a:r>
+            <a:endParaRPr lang="es-ES" sz="1200" dirty="0">
+              <a:latin typeface="Arial" panose="020B0604020202020204" pitchFamily="34" charset="0"/>
+              <a:cs typeface="Arial" panose="020B0604020202020204" pitchFamily="34" charset="0"/>
+            </a:endParaRPr>
           </a:p>
         </p:txBody>
       </p:sp>
@@ -2400,11 +2419,13 @@
         </p:nvCxnSpPr>
         <p:spPr>
           <a:xfrm rot="5400000">
-            <a:off x="4724977" y="457756"/>
-            <a:ext cx="53240" cy="1"/>
+            <a:off x="4712986" y="469747"/>
+            <a:ext cx="77223" cy="1"/>
           </a:xfrm>
           <a:prstGeom prst="bentConnector3">
-            <a:avLst/>
+            <a:avLst>
+              <a:gd name="adj1" fmla="val 50000"/>
+            </a:avLst>
           </a:prstGeom>
           <a:ln w="12700">
             <a:solidFill>
@@ -2435,8 +2456,8 @@
         </p:nvSpPr>
         <p:spPr>
           <a:xfrm>
-            <a:off x="4190380" y="484376"/>
-            <a:ext cx="1122431" cy="230832"/>
+            <a:off x="4190380" y="508359"/>
+            <a:ext cx="1122431" cy="246221"/>
           </a:xfrm>
           <a:prstGeom prst="rect">
             <a:avLst/>
@@ -2451,53 +2472,19 @@
           <a:p>
             <a:pPr algn="ctr"/>
             <a:r>
-              <a:rPr lang="es-ES" sz="900" dirty="0" smtClean="0"/>
-              <a:t>es</a:t>
-            </a:r>
-            <a:endParaRPr lang="es-ES" sz="900" dirty="0"/>
+              <a:rPr lang="es-ES" sz="1000" dirty="0" smtClean="0">
+                <a:latin typeface="Arial" panose="020B0604020202020204" pitchFamily="34" charset="0"/>
+                <a:cs typeface="Arial" panose="020B0604020202020204" pitchFamily="34" charset="0"/>
+              </a:rPr>
+              <a:t>consiste en</a:t>
+            </a:r>
+            <a:endParaRPr lang="es-ES" sz="1000" dirty="0">
+              <a:latin typeface="Arial" panose="020B0604020202020204" pitchFamily="34" charset="0"/>
+              <a:cs typeface="Arial" panose="020B0604020202020204" pitchFamily="34" charset="0"/>
+            </a:endParaRPr>
           </a:p>
         </p:txBody>
       </p:sp>
-      <p:cxnSp>
-        <p:nvCxnSpPr>
-          <p:cNvPr id="362" name="Conector angular 361"/>
-          <p:cNvCxnSpPr>
-            <a:stCxn id="361" idx="2"/>
-            <a:endCxn id="335" idx="0"/>
-          </p:cNvCxnSpPr>
-          <p:nvPr/>
-        </p:nvCxnSpPr>
-        <p:spPr>
-          <a:xfrm rot="16200000" flipH="1">
-            <a:off x="4724479" y="742325"/>
-            <a:ext cx="56004" cy="1770"/>
-          </a:xfrm>
-          <a:prstGeom prst="bentConnector3">
-            <a:avLst>
-              <a:gd name="adj1" fmla="val 50000"/>
-            </a:avLst>
-          </a:prstGeom>
-          <a:ln w="12700">
-            <a:solidFill>
-              <a:schemeClr val="tx1"/>
-            </a:solidFill>
-          </a:ln>
-        </p:spPr>
-        <p:style>
-          <a:lnRef idx="1">
-            <a:schemeClr val="accent1"/>
-          </a:lnRef>
-          <a:fillRef idx="0">
-            <a:schemeClr val="accent1"/>
-          </a:fillRef>
-          <a:effectRef idx="0">
-            <a:schemeClr val="accent1"/>
-          </a:effectRef>
-          <a:fontRef idx="minor">
-            <a:schemeClr val="tx1"/>
-          </a:fontRef>
-        </p:style>
-      </p:cxnSp>
       <p:sp>
         <p:nvSpPr>
           <p:cNvPr id="135" name="Rectángulo 134" descr="Nodo de segundo nivel" title="Nodo02"/>
@@ -2506,7 +2493,7 @@
         </p:nvSpPr>
         <p:spPr>
           <a:xfrm>
-            <a:off x="3745175" y="2628660"/>
+            <a:off x="3699919" y="3048017"/>
             <a:ext cx="998071" cy="357473"/>
           </a:xfrm>
           <a:prstGeom prst="rect">
@@ -2543,17 +2530,21 @@
           <a:p>
             <a:pPr algn="ctr"/>
             <a:r>
-              <a:rPr lang="es-ES" sz="1050" dirty="0" smtClean="0">
+              <a:rPr lang="es-ES" sz="800" dirty="0" smtClean="0">
                 <a:solidFill>
                   <a:schemeClr val="bg1"/>
                 </a:solidFill>
+                <a:latin typeface="Arial" panose="020B0604020202020204" pitchFamily="34" charset="0"/>
+                <a:cs typeface="Arial" panose="020B0604020202020204" pitchFamily="34" charset="0"/>
               </a:rPr>
               <a:t>Diferencia y suma de cubos</a:t>
             </a:r>
-            <a:endParaRPr lang="es-ES" sz="1050" dirty="0">
+            <a:endParaRPr lang="es-ES" sz="800" dirty="0">
               <a:solidFill>
                 <a:schemeClr val="bg1"/>
               </a:solidFill>
+              <a:latin typeface="Arial" panose="020B0604020202020204" pitchFamily="34" charset="0"/>
+              <a:cs typeface="Arial" panose="020B0604020202020204" pitchFamily="34" charset="0"/>
             </a:endParaRPr>
           </a:p>
         </p:txBody>
@@ -2566,7 +2557,7 @@
         </p:nvSpPr>
         <p:spPr>
           <a:xfrm>
-            <a:off x="4871223" y="2612005"/>
+            <a:off x="4825967" y="3031362"/>
             <a:ext cx="707237" cy="357473"/>
           </a:xfrm>
           <a:prstGeom prst="rect">
@@ -2603,17 +2594,21 @@
           <a:p>
             <a:pPr algn="ctr"/>
             <a:r>
-              <a:rPr lang="es-ES" sz="1050" dirty="0" smtClean="0">
+              <a:rPr lang="es-ES" sz="800" dirty="0" smtClean="0">
                 <a:solidFill>
                   <a:schemeClr val="bg1"/>
                 </a:solidFill>
+                <a:latin typeface="Arial" panose="020B0604020202020204" pitchFamily="34" charset="0"/>
+                <a:cs typeface="Arial" panose="020B0604020202020204" pitchFamily="34" charset="0"/>
               </a:rPr>
               <a:t>Trinomio cuadrado</a:t>
             </a:r>
-            <a:endParaRPr lang="es-ES" sz="1050" dirty="0">
+            <a:endParaRPr lang="es-ES" sz="800" dirty="0">
               <a:solidFill>
                 <a:schemeClr val="bg1"/>
               </a:solidFill>
+              <a:latin typeface="Arial" panose="020B0604020202020204" pitchFamily="34" charset="0"/>
+              <a:cs typeface="Arial" panose="020B0604020202020204" pitchFamily="34" charset="0"/>
             </a:endParaRPr>
           </a:p>
         </p:txBody>
@@ -2626,7 +2621,7 @@
         </p:nvSpPr>
         <p:spPr>
           <a:xfrm>
-            <a:off x="6531407" y="2583372"/>
+            <a:off x="6486151" y="3002729"/>
             <a:ext cx="652171" cy="357473"/>
           </a:xfrm>
           <a:prstGeom prst="rect">
@@ -2663,25 +2658,21 @@
           <a:p>
             <a:pPr algn="ctr"/>
             <a:r>
-              <a:rPr lang="es-ES" sz="1050" dirty="0" smtClean="0">
+              <a:rPr lang="es-ES" sz="800" dirty="0" smtClean="0">
                 <a:solidFill>
                   <a:schemeClr val="bg1"/>
                 </a:solidFill>
-              </a:rPr>
-              <a:t>Cubo perfect</a:t>
-            </a:r>
-            <a:r>
-              <a:rPr lang="es-ES" sz="1050" dirty="0" smtClean="0">
-                <a:solidFill>
-                  <a:schemeClr val="bg1"/>
-                </a:solidFill>
-              </a:rPr>
-              <a:t>o</a:t>
-            </a:r>
-            <a:endParaRPr lang="es-ES" sz="1050" dirty="0">
+                <a:latin typeface="Arial" panose="020B0604020202020204" pitchFamily="34" charset="0"/>
+                <a:cs typeface="Arial" panose="020B0604020202020204" pitchFamily="34" charset="0"/>
+              </a:rPr>
+              <a:t>Cubo perfecto</a:t>
+            </a:r>
+            <a:endParaRPr lang="es-ES" sz="800" dirty="0">
               <a:solidFill>
                 <a:schemeClr val="bg1"/>
               </a:solidFill>
+              <a:latin typeface="Arial" panose="020B0604020202020204" pitchFamily="34" charset="0"/>
+              <a:cs typeface="Arial" panose="020B0604020202020204" pitchFamily="34" charset="0"/>
             </a:endParaRPr>
           </a:p>
         </p:txBody>
@@ -2694,7 +2685,7 @@
         </p:nvSpPr>
         <p:spPr>
           <a:xfrm>
-            <a:off x="8005867" y="2587577"/>
+            <a:off x="7960611" y="3006934"/>
             <a:ext cx="730876" cy="357473"/>
           </a:xfrm>
           <a:prstGeom prst="rect">
@@ -2731,17 +2722,21 @@
           <a:p>
             <a:pPr algn="ctr"/>
             <a:r>
-              <a:rPr lang="es-ES" sz="1050" dirty="0" smtClean="0">
+              <a:rPr lang="es-ES" sz="1000" dirty="0" smtClean="0">
                 <a:solidFill>
                   <a:schemeClr val="bg1"/>
                 </a:solidFill>
+                <a:latin typeface="Arial" panose="020B0604020202020204" pitchFamily="34" charset="0"/>
+                <a:cs typeface="Arial" panose="020B0604020202020204" pitchFamily="34" charset="0"/>
               </a:rPr>
               <a:t>Potencias iguales</a:t>
             </a:r>
-            <a:endParaRPr lang="es-ES" sz="1050" dirty="0">
+            <a:endParaRPr lang="es-ES" sz="1000" dirty="0">
               <a:solidFill>
                 <a:schemeClr val="bg1"/>
               </a:solidFill>
+              <a:latin typeface="Arial" panose="020B0604020202020204" pitchFamily="34" charset="0"/>
+              <a:cs typeface="Arial" panose="020B0604020202020204" pitchFamily="34" charset="0"/>
             </a:endParaRPr>
           </a:p>
         </p:txBody>
@@ -2756,9 +2751,9 @@
           <p:nvPr/>
         </p:nvCxnSpPr>
         <p:spPr>
-          <a:xfrm rot="16200000" flipH="1">
-            <a:off x="5600661" y="1326540"/>
-            <a:ext cx="421692" cy="2091971"/>
+          <a:xfrm rot="5400000">
+            <a:off x="6406189" y="2400432"/>
+            <a:ext cx="1008345" cy="196248"/>
           </a:xfrm>
           <a:prstGeom prst="bentConnector3">
             <a:avLst>
@@ -2797,8 +2792,8 @@
         </p:nvCxnSpPr>
         <p:spPr>
           <a:xfrm rot="16200000" flipH="1">
-            <a:off x="6355465" y="571736"/>
-            <a:ext cx="425897" cy="3605783"/>
+            <a:off x="7160992" y="1841877"/>
+            <a:ext cx="1012550" cy="1317564"/>
           </a:xfrm>
           <a:prstGeom prst="bentConnector3">
             <a:avLst>
@@ -2836,9 +2831,9 @@
           <p:nvPr/>
         </p:nvCxnSpPr>
         <p:spPr>
-          <a:xfrm rot="16200000" flipH="1">
-            <a:off x="4770020" y="2157182"/>
-            <a:ext cx="450325" cy="459320"/>
+          <a:xfrm rot="5400000">
+            <a:off x="5575547" y="1598424"/>
+            <a:ext cx="1036978" cy="1828899"/>
           </a:xfrm>
           <a:prstGeom prst="bentConnector3">
             <a:avLst>
@@ -2874,7 +2869,7 @@
         </p:nvSpPr>
         <p:spPr>
           <a:xfrm>
-            <a:off x="4222554" y="4830462"/>
+            <a:off x="4177298" y="5249819"/>
             <a:ext cx="888843" cy="418250"/>
           </a:xfrm>
           <a:prstGeom prst="rect">
@@ -2911,17 +2906,21 @@
           <a:p>
             <a:pPr algn="ctr"/>
             <a:r>
-              <a:rPr lang="es-ES" sz="900" dirty="0" smtClean="0">
+              <a:rPr lang="es-ES" sz="800" dirty="0" smtClean="0">
                 <a:solidFill>
                   <a:schemeClr val="tx1"/>
                 </a:solidFill>
+                <a:latin typeface="Arial" panose="020B0604020202020204" pitchFamily="34" charset="0"/>
+                <a:cs typeface="Arial" panose="020B0604020202020204" pitchFamily="34" charset="0"/>
               </a:rPr>
               <a:t>Trinomio por adición y sustracción</a:t>
             </a:r>
-            <a:endParaRPr lang="es-ES" sz="900" dirty="0">
+            <a:endParaRPr lang="es-ES" sz="800" dirty="0">
               <a:solidFill>
                 <a:schemeClr val="tx1"/>
               </a:solidFill>
+              <a:latin typeface="Arial" panose="020B0604020202020204" pitchFamily="34" charset="0"/>
+              <a:cs typeface="Arial" panose="020B0604020202020204" pitchFamily="34" charset="0"/>
             </a:endParaRPr>
           </a:p>
         </p:txBody>
@@ -2934,7 +2933,7 @@
         </p:nvSpPr>
         <p:spPr>
           <a:xfrm>
-            <a:off x="5326020" y="4835028"/>
+            <a:off x="5280764" y="5254385"/>
             <a:ext cx="1122431" cy="343441"/>
           </a:xfrm>
           <a:prstGeom prst="rect">
@@ -2971,41 +2970,63 @@
           <a:p>
             <a:pPr algn="ctr"/>
             <a:r>
-              <a:rPr lang="es-ES" sz="900" dirty="0" smtClean="0">
+              <a:rPr lang="es-ES" sz="800" dirty="0" smtClean="0">
                 <a:solidFill>
                   <a:schemeClr val="tx1"/>
                 </a:solidFill>
+                <a:latin typeface="Arial" panose="020B0604020202020204" pitchFamily="34" charset="0"/>
+                <a:cs typeface="Arial" panose="020B0604020202020204" pitchFamily="34" charset="0"/>
               </a:rPr>
               <a:t>Trinomio de la forma </a:t>
             </a:r>
             <a:r>
-              <a:rPr lang="es-ES_tradnl" sz="900" i="1" dirty="0"/>
+              <a:rPr lang="es-ES_tradnl" sz="800" i="1" dirty="0">
+                <a:latin typeface="Arial" panose="020B0604020202020204" pitchFamily="34" charset="0"/>
+                <a:cs typeface="Arial" panose="020B0604020202020204" pitchFamily="34" charset="0"/>
+              </a:rPr>
               <a:t>x</a:t>
             </a:r>
             <a:r>
-              <a:rPr lang="es-ES_tradnl" sz="900" i="1" baseline="30000" dirty="0"/>
+              <a:rPr lang="es-ES_tradnl" sz="800" i="1" baseline="30000" dirty="0">
+                <a:latin typeface="Arial" panose="020B0604020202020204" pitchFamily="34" charset="0"/>
+                <a:cs typeface="Arial" panose="020B0604020202020204" pitchFamily="34" charset="0"/>
+              </a:rPr>
               <a:t>2n</a:t>
             </a:r>
             <a:r>
-              <a:rPr lang="es-ES_tradnl" sz="900" i="1" dirty="0"/>
+              <a:rPr lang="es-ES_tradnl" sz="800" i="1" dirty="0">
+                <a:latin typeface="Arial" panose="020B0604020202020204" pitchFamily="34" charset="0"/>
+                <a:cs typeface="Arial" panose="020B0604020202020204" pitchFamily="34" charset="0"/>
+              </a:rPr>
               <a:t> + </a:t>
             </a:r>
             <a:r>
-              <a:rPr lang="es-ES_tradnl" sz="900" i="1" dirty="0" err="1"/>
+              <a:rPr lang="es-ES_tradnl" sz="800" i="1" dirty="0" err="1">
+                <a:latin typeface="Arial" panose="020B0604020202020204" pitchFamily="34" charset="0"/>
+                <a:cs typeface="Arial" panose="020B0604020202020204" pitchFamily="34" charset="0"/>
+              </a:rPr>
               <a:t>bx</a:t>
             </a:r>
             <a:r>
-              <a:rPr lang="es-ES_tradnl" sz="900" i="1" baseline="30000" dirty="0" err="1"/>
+              <a:rPr lang="es-ES_tradnl" sz="800" i="1" baseline="30000" dirty="0" err="1">
+                <a:latin typeface="Arial" panose="020B0604020202020204" pitchFamily="34" charset="0"/>
+                <a:cs typeface="Arial" panose="020B0604020202020204" pitchFamily="34" charset="0"/>
+              </a:rPr>
               <a:t>n</a:t>
             </a:r>
             <a:r>
-              <a:rPr lang="es-ES_tradnl" sz="900" i="1" dirty="0"/>
+              <a:rPr lang="es-ES_tradnl" sz="800" i="1" dirty="0">
+                <a:latin typeface="Arial" panose="020B0604020202020204" pitchFamily="34" charset="0"/>
+                <a:cs typeface="Arial" panose="020B0604020202020204" pitchFamily="34" charset="0"/>
+              </a:rPr>
               <a:t> + c</a:t>
             </a:r>
-            <a:endParaRPr lang="es-ES" sz="900" dirty="0">
+            <a:endParaRPr lang="es-ES" sz="800" dirty="0">
               <a:solidFill>
                 <a:schemeClr val="tx1"/>
               </a:solidFill>
+              <a:latin typeface="Arial" panose="020B0604020202020204" pitchFamily="34" charset="0"/>
+              <a:cs typeface="Arial" panose="020B0604020202020204" pitchFamily="34" charset="0"/>
             </a:endParaRPr>
           </a:p>
         </p:txBody>
@@ -3018,7 +3039,7 @@
         </p:nvSpPr>
         <p:spPr>
           <a:xfrm>
-            <a:off x="6712513" y="4826790"/>
+            <a:off x="6667257" y="5246147"/>
             <a:ext cx="1142642" cy="471267"/>
           </a:xfrm>
           <a:prstGeom prst="rect">
@@ -3055,45 +3076,70 @@
           <a:p>
             <a:pPr algn="ctr"/>
             <a:r>
-              <a:rPr lang="es-ES" sz="900" dirty="0" smtClean="0">
+              <a:rPr lang="es-ES" sz="800" dirty="0" smtClean="0">
                 <a:solidFill>
                   <a:schemeClr val="tx1"/>
                 </a:solidFill>
+                <a:latin typeface="Arial" panose="020B0604020202020204" pitchFamily="34" charset="0"/>
+                <a:cs typeface="Arial" panose="020B0604020202020204" pitchFamily="34" charset="0"/>
               </a:rPr>
               <a:t>Trinomio de la forma </a:t>
             </a:r>
             <a:r>
-              <a:rPr lang="es-ES_tradnl" sz="900" i="1" dirty="0"/>
+              <a:rPr lang="es-ES_tradnl" sz="800" i="1" dirty="0">
+                <a:latin typeface="Arial" panose="020B0604020202020204" pitchFamily="34" charset="0"/>
+                <a:cs typeface="Arial" panose="020B0604020202020204" pitchFamily="34" charset="0"/>
+              </a:rPr>
               <a:t>ax</a:t>
             </a:r>
             <a:r>
-              <a:rPr lang="es-ES_tradnl" sz="900" i="1" baseline="30000" dirty="0"/>
+              <a:rPr lang="es-ES_tradnl" sz="800" i="1" baseline="30000" dirty="0">
+                <a:latin typeface="Arial" panose="020B0604020202020204" pitchFamily="34" charset="0"/>
+                <a:cs typeface="Arial" panose="020B0604020202020204" pitchFamily="34" charset="0"/>
+              </a:rPr>
               <a:t>2n</a:t>
             </a:r>
             <a:r>
-              <a:rPr lang="es-ES_tradnl" sz="900" i="1" dirty="0"/>
+              <a:rPr lang="es-ES_tradnl" sz="800" i="1" dirty="0">
+                <a:latin typeface="Arial" panose="020B0604020202020204" pitchFamily="34" charset="0"/>
+                <a:cs typeface="Arial" panose="020B0604020202020204" pitchFamily="34" charset="0"/>
+              </a:rPr>
               <a:t> + </a:t>
             </a:r>
             <a:r>
-              <a:rPr lang="es-ES_tradnl" sz="900" i="1" dirty="0" err="1"/>
+              <a:rPr lang="es-ES_tradnl" sz="800" i="1" dirty="0" err="1">
+                <a:latin typeface="Arial" panose="020B0604020202020204" pitchFamily="34" charset="0"/>
+                <a:cs typeface="Arial" panose="020B0604020202020204" pitchFamily="34" charset="0"/>
+              </a:rPr>
               <a:t>bx</a:t>
             </a:r>
             <a:r>
-              <a:rPr lang="es-ES_tradnl" sz="900" i="1" baseline="30000" dirty="0" err="1"/>
+              <a:rPr lang="es-ES_tradnl" sz="800" i="1" baseline="30000" dirty="0" err="1">
+                <a:latin typeface="Arial" panose="020B0604020202020204" pitchFamily="34" charset="0"/>
+                <a:cs typeface="Arial" panose="020B0604020202020204" pitchFamily="34" charset="0"/>
+              </a:rPr>
               <a:t>n</a:t>
             </a:r>
             <a:r>
-              <a:rPr lang="es-ES_tradnl" sz="900" i="1" dirty="0"/>
+              <a:rPr lang="es-ES_tradnl" sz="800" i="1" dirty="0">
+                <a:latin typeface="Arial" panose="020B0604020202020204" pitchFamily="34" charset="0"/>
+                <a:cs typeface="Arial" panose="020B0604020202020204" pitchFamily="34" charset="0"/>
+              </a:rPr>
               <a:t> + c</a:t>
             </a:r>
             <a:r>
-              <a:rPr lang="es-ES_tradnl" sz="900" dirty="0"/>
+              <a:rPr lang="es-ES_tradnl" sz="800" dirty="0">
+                <a:latin typeface="Arial" panose="020B0604020202020204" pitchFamily="34" charset="0"/>
+                <a:cs typeface="Arial" panose="020B0604020202020204" pitchFamily="34" charset="0"/>
+              </a:rPr>
               <a:t> </a:t>
             </a:r>
-            <a:endParaRPr lang="es-ES" sz="900" dirty="0">
+            <a:endParaRPr lang="es-ES" sz="800" dirty="0">
               <a:solidFill>
                 <a:schemeClr val="tx1"/>
               </a:solidFill>
+              <a:latin typeface="Arial" panose="020B0604020202020204" pitchFamily="34" charset="0"/>
+              <a:cs typeface="Arial" panose="020B0604020202020204" pitchFamily="34" charset="0"/>
             </a:endParaRPr>
           </a:p>
         </p:txBody>
@@ -3109,7 +3155,7 @@
         </p:nvCxnSpPr>
         <p:spPr>
           <a:xfrm rot="16200000" flipH="1">
-            <a:off x="4623264" y="3571056"/>
+            <a:off x="4578008" y="3990413"/>
             <a:ext cx="1865550" cy="662394"/>
           </a:xfrm>
           <a:prstGeom prst="bentConnector3">
@@ -3149,7 +3195,7 @@
         </p:nvCxnSpPr>
         <p:spPr>
           <a:xfrm rot="16200000" flipH="1">
-            <a:off x="5325682" y="2868638"/>
+            <a:off x="5280426" y="3287995"/>
             <a:ext cx="1857312" cy="2058992"/>
           </a:xfrm>
           <a:prstGeom prst="bentConnector3">
@@ -3186,8 +3232,8 @@
         </p:nvSpPr>
         <p:spPr>
           <a:xfrm>
-            <a:off x="2306611" y="3032712"/>
-            <a:ext cx="1117174" cy="230832"/>
+            <a:off x="2261355" y="3452069"/>
+            <a:ext cx="1117174" cy="215444"/>
           </a:xfrm>
           <a:prstGeom prst="rect">
             <a:avLst/>
@@ -3202,10 +3248,16 @@
           <a:p>
             <a:pPr algn="ctr"/>
             <a:r>
-              <a:rPr lang="es-ES" sz="900" dirty="0" smtClean="0"/>
+              <a:rPr lang="es-ES" sz="800" dirty="0" smtClean="0">
+                <a:latin typeface="Arial" panose="020B0604020202020204" pitchFamily="34" charset="0"/>
+                <a:cs typeface="Arial" panose="020B0604020202020204" pitchFamily="34" charset="0"/>
+              </a:rPr>
               <a:t>ejemplo</a:t>
             </a:r>
-            <a:endParaRPr lang="es-ES" sz="900" dirty="0"/>
+            <a:endParaRPr lang="es-ES" sz="800" dirty="0">
+              <a:latin typeface="Arial" panose="020B0604020202020204" pitchFamily="34" charset="0"/>
+              <a:cs typeface="Arial" panose="020B0604020202020204" pitchFamily="34" charset="0"/>
+            </a:endParaRPr>
           </a:p>
         </p:txBody>
       </p:sp>
@@ -3217,8 +3269,8 @@
         </p:nvSpPr>
         <p:spPr>
           <a:xfrm>
-            <a:off x="3687401" y="3040418"/>
-            <a:ext cx="1117174" cy="230832"/>
+            <a:off x="3642145" y="3459775"/>
+            <a:ext cx="1117174" cy="215444"/>
           </a:xfrm>
           <a:prstGeom prst="rect">
             <a:avLst/>
@@ -3233,10 +3285,16 @@
           <a:p>
             <a:pPr algn="ctr"/>
             <a:r>
-              <a:rPr lang="es-ES" sz="900" dirty="0" smtClean="0"/>
+              <a:rPr lang="es-ES" sz="800" dirty="0" smtClean="0">
+                <a:latin typeface="Arial" panose="020B0604020202020204" pitchFamily="34" charset="0"/>
+                <a:cs typeface="Arial" panose="020B0604020202020204" pitchFamily="34" charset="0"/>
+              </a:rPr>
               <a:t>ejemplo</a:t>
             </a:r>
-            <a:endParaRPr lang="es-ES" sz="900" dirty="0"/>
+            <a:endParaRPr lang="es-ES" sz="800" dirty="0">
+              <a:latin typeface="Arial" panose="020B0604020202020204" pitchFamily="34" charset="0"/>
+              <a:cs typeface="Arial" panose="020B0604020202020204" pitchFamily="34" charset="0"/>
+            </a:endParaRPr>
           </a:p>
         </p:txBody>
       </p:sp>
@@ -3248,8 +3306,8 @@
         </p:nvSpPr>
         <p:spPr>
           <a:xfrm>
-            <a:off x="7810346" y="3032284"/>
-            <a:ext cx="1117174" cy="230832"/>
+            <a:off x="7765090" y="3451641"/>
+            <a:ext cx="1117174" cy="246221"/>
           </a:xfrm>
           <a:prstGeom prst="rect">
             <a:avLst/>
@@ -3264,10 +3322,16 @@
           <a:p>
             <a:pPr algn="ctr"/>
             <a:r>
-              <a:rPr lang="es-ES" sz="900" dirty="0" smtClean="0"/>
+              <a:rPr lang="es-ES" sz="1000" dirty="0" smtClean="0">
+                <a:latin typeface="Arial" panose="020B0604020202020204" pitchFamily="34" charset="0"/>
+                <a:cs typeface="Arial" panose="020B0604020202020204" pitchFamily="34" charset="0"/>
+              </a:rPr>
               <a:t>ejemplo</a:t>
             </a:r>
-            <a:endParaRPr lang="es-ES" sz="900" dirty="0"/>
+            <a:endParaRPr lang="es-ES" sz="1000" dirty="0">
+              <a:latin typeface="Arial" panose="020B0604020202020204" pitchFamily="34" charset="0"/>
+              <a:cs typeface="Arial" panose="020B0604020202020204" pitchFamily="34" charset="0"/>
+            </a:endParaRPr>
           </a:p>
         </p:txBody>
       </p:sp>
@@ -3279,8 +3343,8 @@
         </p:nvSpPr>
         <p:spPr>
           <a:xfrm>
-            <a:off x="6303799" y="3016187"/>
-            <a:ext cx="1117174" cy="230832"/>
+            <a:off x="6258543" y="3435544"/>
+            <a:ext cx="1117174" cy="215444"/>
           </a:xfrm>
           <a:prstGeom prst="rect">
             <a:avLst/>
@@ -3295,10 +3359,16 @@
           <a:p>
             <a:pPr algn="ctr"/>
             <a:r>
-              <a:rPr lang="es-ES" sz="900" dirty="0" smtClean="0"/>
+              <a:rPr lang="es-ES" sz="800" dirty="0" smtClean="0">
+                <a:latin typeface="Arial" panose="020B0604020202020204" pitchFamily="34" charset="0"/>
+                <a:cs typeface="Arial" panose="020B0604020202020204" pitchFamily="34" charset="0"/>
+              </a:rPr>
               <a:t>ejemplo</a:t>
             </a:r>
-            <a:endParaRPr lang="es-ES" sz="900" dirty="0"/>
+            <a:endParaRPr lang="es-ES" sz="800" dirty="0">
+              <a:latin typeface="Arial" panose="020B0604020202020204" pitchFamily="34" charset="0"/>
+              <a:cs typeface="Arial" panose="020B0604020202020204" pitchFamily="34" charset="0"/>
+            </a:endParaRPr>
           </a:p>
         </p:txBody>
       </p:sp>
@@ -3310,7 +3380,7 @@
         </p:nvSpPr>
         <p:spPr>
           <a:xfrm>
-            <a:off x="2331925" y="3308917"/>
+            <a:off x="2286669" y="3728274"/>
             <a:ext cx="1063914" cy="362613"/>
           </a:xfrm>
           <a:prstGeom prst="rect">
@@ -3345,85 +3415,144 @@
           <a:p>
             <a:pPr algn="ctr"/>
             <a:r>
-              <a:rPr lang="es-ES_tradnl" sz="900" dirty="0"/>
+              <a:rPr lang="es-ES_tradnl" sz="800" dirty="0">
+                <a:latin typeface="Arial" panose="020B0604020202020204" pitchFamily="34" charset="0"/>
+                <a:cs typeface="Arial" panose="020B0604020202020204" pitchFamily="34" charset="0"/>
+              </a:rPr>
               <a:t>25</a:t>
             </a:r>
             <a:r>
-              <a:rPr lang="es-ES_tradnl" sz="900" i="1" dirty="0"/>
+              <a:rPr lang="es-ES_tradnl" sz="800" i="1" dirty="0">
+                <a:latin typeface="Arial" panose="020B0604020202020204" pitchFamily="34" charset="0"/>
+                <a:cs typeface="Arial" panose="020B0604020202020204" pitchFamily="34" charset="0"/>
+              </a:rPr>
               <a:t>x</a:t>
             </a:r>
             <a:r>
-              <a:rPr lang="es-ES_tradnl" sz="900" i="1" baseline="30000" dirty="0"/>
+              <a:rPr lang="es-ES_tradnl" sz="800" i="1" baseline="30000" dirty="0">
+                <a:latin typeface="Arial" panose="020B0604020202020204" pitchFamily="34" charset="0"/>
+                <a:cs typeface="Arial" panose="020B0604020202020204" pitchFamily="34" charset="0"/>
+              </a:rPr>
               <a:t>2</a:t>
             </a:r>
             <a:r>
-              <a:rPr lang="es-ES_tradnl" sz="900" i="1" dirty="0"/>
+              <a:rPr lang="es-ES_tradnl" sz="800" i="1" dirty="0">
+                <a:latin typeface="Arial" panose="020B0604020202020204" pitchFamily="34" charset="0"/>
+                <a:cs typeface="Arial" panose="020B0604020202020204" pitchFamily="34" charset="0"/>
+              </a:rPr>
               <a:t> – </a:t>
             </a:r>
             <a:r>
-              <a:rPr lang="es-ES_tradnl" sz="900" dirty="0"/>
+              <a:rPr lang="es-ES_tradnl" sz="800" dirty="0">
+                <a:latin typeface="Arial" panose="020B0604020202020204" pitchFamily="34" charset="0"/>
+                <a:cs typeface="Arial" panose="020B0604020202020204" pitchFamily="34" charset="0"/>
+              </a:rPr>
               <a:t>16</a:t>
             </a:r>
             <a:r>
-              <a:rPr lang="es-ES_tradnl" sz="900" i="1" dirty="0"/>
+              <a:rPr lang="es-ES_tradnl" sz="800" i="1" dirty="0">
+                <a:latin typeface="Arial" panose="020B0604020202020204" pitchFamily="34" charset="0"/>
+                <a:cs typeface="Arial" panose="020B0604020202020204" pitchFamily="34" charset="0"/>
+              </a:rPr>
               <a:t>y</a:t>
             </a:r>
             <a:r>
-              <a:rPr lang="es-ES_tradnl" sz="900" i="1" baseline="30000" dirty="0"/>
+              <a:rPr lang="es-ES_tradnl" sz="800" i="1" baseline="30000" dirty="0">
+                <a:latin typeface="Arial" panose="020B0604020202020204" pitchFamily="34" charset="0"/>
+                <a:cs typeface="Arial" panose="020B0604020202020204" pitchFamily="34" charset="0"/>
+              </a:rPr>
               <a:t>2</a:t>
             </a:r>
             <a:r>
-              <a:rPr lang="es-ES_tradnl" sz="900" i="1" dirty="0"/>
+              <a:rPr lang="es-ES_tradnl" sz="800" i="1" dirty="0">
+                <a:latin typeface="Arial" panose="020B0604020202020204" pitchFamily="34" charset="0"/>
+                <a:cs typeface="Arial" panose="020B0604020202020204" pitchFamily="34" charset="0"/>
+              </a:rPr>
               <a:t> = </a:t>
             </a:r>
-            <a:endParaRPr lang="es-ES_tradnl" sz="900" i="1" dirty="0" smtClean="0"/>
+            <a:endParaRPr lang="es-ES_tradnl" sz="800" i="1" dirty="0" smtClean="0">
+              <a:latin typeface="Arial" panose="020B0604020202020204" pitchFamily="34" charset="0"/>
+              <a:cs typeface="Arial" panose="020B0604020202020204" pitchFamily="34" charset="0"/>
+            </a:endParaRPr>
           </a:p>
           <a:p>
             <a:pPr algn="ctr"/>
             <a:r>
-              <a:rPr lang="es-ES_tradnl" sz="900" dirty="0" smtClean="0"/>
+              <a:rPr lang="es-ES_tradnl" sz="800" dirty="0" smtClean="0">
+                <a:latin typeface="Arial" panose="020B0604020202020204" pitchFamily="34" charset="0"/>
+                <a:cs typeface="Arial" panose="020B0604020202020204" pitchFamily="34" charset="0"/>
+              </a:rPr>
               <a:t>(</a:t>
             </a:r>
             <a:r>
-              <a:rPr lang="es-ES_tradnl" sz="900" dirty="0"/>
+              <a:rPr lang="es-ES_tradnl" sz="800" dirty="0">
+                <a:latin typeface="Arial" panose="020B0604020202020204" pitchFamily="34" charset="0"/>
+                <a:cs typeface="Arial" panose="020B0604020202020204" pitchFamily="34" charset="0"/>
+              </a:rPr>
               <a:t>5</a:t>
             </a:r>
             <a:r>
-              <a:rPr lang="es-ES_tradnl" sz="900" i="1" dirty="0"/>
+              <a:rPr lang="es-ES_tradnl" sz="800" i="1" dirty="0">
+                <a:latin typeface="Arial" panose="020B0604020202020204" pitchFamily="34" charset="0"/>
+                <a:cs typeface="Arial" panose="020B0604020202020204" pitchFamily="34" charset="0"/>
+              </a:rPr>
               <a:t>x –</a:t>
             </a:r>
             <a:r>
-              <a:rPr lang="es-ES_tradnl" sz="900" dirty="0"/>
+              <a:rPr lang="es-ES_tradnl" sz="800" dirty="0">
+                <a:latin typeface="Arial" panose="020B0604020202020204" pitchFamily="34" charset="0"/>
+                <a:cs typeface="Arial" panose="020B0604020202020204" pitchFamily="34" charset="0"/>
+              </a:rPr>
               <a:t> 4</a:t>
             </a:r>
             <a:r>
-              <a:rPr lang="es-ES_tradnl" sz="900" i="1" dirty="0"/>
+              <a:rPr lang="es-ES_tradnl" sz="800" i="1" dirty="0">
+                <a:latin typeface="Arial" panose="020B0604020202020204" pitchFamily="34" charset="0"/>
+                <a:cs typeface="Arial" panose="020B0604020202020204" pitchFamily="34" charset="0"/>
+              </a:rPr>
               <a:t>y</a:t>
             </a:r>
             <a:r>
-              <a:rPr lang="es-ES_tradnl" sz="900" dirty="0"/>
+              <a:rPr lang="es-ES_tradnl" sz="800" dirty="0">
+                <a:latin typeface="Arial" panose="020B0604020202020204" pitchFamily="34" charset="0"/>
+                <a:cs typeface="Arial" panose="020B0604020202020204" pitchFamily="34" charset="0"/>
+              </a:rPr>
               <a:t>) (5</a:t>
             </a:r>
             <a:r>
-              <a:rPr lang="es-ES_tradnl" sz="900" i="1" dirty="0"/>
+              <a:rPr lang="es-ES_tradnl" sz="800" i="1" dirty="0">
+                <a:latin typeface="Arial" panose="020B0604020202020204" pitchFamily="34" charset="0"/>
+                <a:cs typeface="Arial" panose="020B0604020202020204" pitchFamily="34" charset="0"/>
+              </a:rPr>
               <a:t>x </a:t>
             </a:r>
             <a:r>
-              <a:rPr lang="es-ES_tradnl" sz="900" dirty="0"/>
+              <a:rPr lang="es-ES_tradnl" sz="800" dirty="0">
+                <a:latin typeface="Arial" panose="020B0604020202020204" pitchFamily="34" charset="0"/>
+                <a:cs typeface="Arial" panose="020B0604020202020204" pitchFamily="34" charset="0"/>
+              </a:rPr>
               <a:t>+ 4</a:t>
             </a:r>
             <a:r>
-              <a:rPr lang="es-ES_tradnl" sz="900" i="1" dirty="0"/>
+              <a:rPr lang="es-ES_tradnl" sz="800" i="1" dirty="0">
+                <a:latin typeface="Arial" panose="020B0604020202020204" pitchFamily="34" charset="0"/>
+                <a:cs typeface="Arial" panose="020B0604020202020204" pitchFamily="34" charset="0"/>
+              </a:rPr>
               <a:t>y</a:t>
             </a:r>
             <a:r>
-              <a:rPr lang="es-ES_tradnl" sz="900" dirty="0" smtClean="0"/>
+              <a:rPr lang="es-ES_tradnl" sz="800" dirty="0" smtClean="0">
+                <a:latin typeface="Arial" panose="020B0604020202020204" pitchFamily="34" charset="0"/>
+                <a:cs typeface="Arial" panose="020B0604020202020204" pitchFamily="34" charset="0"/>
+              </a:rPr>
               <a:t>)</a:t>
             </a:r>
-            <a:endParaRPr lang="es-ES" sz="900" dirty="0">
+            <a:endParaRPr lang="es-ES" sz="800" dirty="0">
               <a:solidFill>
                 <a:schemeClr val="tx1"/>
               </a:solidFill>
+              <a:latin typeface="Arial" panose="020B0604020202020204" pitchFamily="34" charset="0"/>
+              <a:cs typeface="Arial" panose="020B0604020202020204" pitchFamily="34" charset="0"/>
             </a:endParaRPr>
           </a:p>
         </p:txBody>
@@ -3436,7 +3565,7 @@
         </p:nvSpPr>
         <p:spPr>
           <a:xfrm>
-            <a:off x="3448645" y="3318011"/>
+            <a:off x="3403389" y="3737368"/>
             <a:ext cx="1592402" cy="353519"/>
           </a:xfrm>
           <a:prstGeom prst="rect">
@@ -3470,124 +3599,214 @@
           <a:lstStyle/>
           <a:p>
             <a:r>
-              <a:rPr lang="es-ES_tradnl" sz="900" dirty="0"/>
+              <a:rPr lang="es-ES_tradnl" sz="800" dirty="0">
+                <a:latin typeface="Arial" panose="020B0604020202020204" pitchFamily="34" charset="0"/>
+                <a:cs typeface="Arial" panose="020B0604020202020204" pitchFamily="34" charset="0"/>
+              </a:rPr>
               <a:t>8</a:t>
             </a:r>
             <a:r>
-              <a:rPr lang="es-ES_tradnl" sz="900" i="1" dirty="0"/>
+              <a:rPr lang="es-ES_tradnl" sz="800" i="1" dirty="0">
+                <a:latin typeface="Arial" panose="020B0604020202020204" pitchFamily="34" charset="0"/>
+                <a:cs typeface="Arial" panose="020B0604020202020204" pitchFamily="34" charset="0"/>
+              </a:rPr>
               <a:t>x</a:t>
             </a:r>
             <a:r>
-              <a:rPr lang="es-ES_tradnl" sz="900" i="1" baseline="30000" dirty="0"/>
+              <a:rPr lang="es-ES_tradnl" sz="800" i="1" baseline="30000" dirty="0">
+                <a:latin typeface="Arial" panose="020B0604020202020204" pitchFamily="34" charset="0"/>
+                <a:cs typeface="Arial" panose="020B0604020202020204" pitchFamily="34" charset="0"/>
+              </a:rPr>
               <a:t>3</a:t>
             </a:r>
             <a:r>
-              <a:rPr lang="es-ES_tradnl" sz="900" i="1" dirty="0"/>
+              <a:rPr lang="es-ES_tradnl" sz="800" i="1" dirty="0">
+                <a:latin typeface="Arial" panose="020B0604020202020204" pitchFamily="34" charset="0"/>
+                <a:cs typeface="Arial" panose="020B0604020202020204" pitchFamily="34" charset="0"/>
+              </a:rPr>
               <a:t> – </a:t>
             </a:r>
             <a:r>
-              <a:rPr lang="es-ES_tradnl" sz="900" dirty="0"/>
+              <a:rPr lang="es-ES_tradnl" sz="800" dirty="0">
+                <a:latin typeface="Arial" panose="020B0604020202020204" pitchFamily="34" charset="0"/>
+                <a:cs typeface="Arial" panose="020B0604020202020204" pitchFamily="34" charset="0"/>
+              </a:rPr>
               <a:t>1</a:t>
             </a:r>
             <a:r>
-              <a:rPr lang="es-ES_tradnl" sz="900" i="1" dirty="0"/>
+              <a:rPr lang="es-ES_tradnl" sz="800" i="1" dirty="0">
+                <a:latin typeface="Arial" panose="020B0604020202020204" pitchFamily="34" charset="0"/>
+                <a:cs typeface="Arial" panose="020B0604020202020204" pitchFamily="34" charset="0"/>
+              </a:rPr>
               <a:t> = </a:t>
             </a:r>
             <a:r>
-              <a:rPr lang="es-ES_tradnl" sz="900" dirty="0"/>
+              <a:rPr lang="es-ES_tradnl" sz="800" dirty="0">
+                <a:latin typeface="Arial" panose="020B0604020202020204" pitchFamily="34" charset="0"/>
+                <a:cs typeface="Arial" panose="020B0604020202020204" pitchFamily="34" charset="0"/>
+              </a:rPr>
               <a:t>(2</a:t>
             </a:r>
             <a:r>
-              <a:rPr lang="es-ES_tradnl" sz="900" i="1" dirty="0"/>
+              <a:rPr lang="es-ES_tradnl" sz="800" i="1" dirty="0">
+                <a:latin typeface="Arial" panose="020B0604020202020204" pitchFamily="34" charset="0"/>
+                <a:cs typeface="Arial" panose="020B0604020202020204" pitchFamily="34" charset="0"/>
+              </a:rPr>
               <a:t>x – </a:t>
             </a:r>
             <a:r>
-              <a:rPr lang="es-ES_tradnl" sz="900" dirty="0"/>
+              <a:rPr lang="es-ES_tradnl" sz="800" dirty="0">
+                <a:latin typeface="Arial" panose="020B0604020202020204" pitchFamily="34" charset="0"/>
+                <a:cs typeface="Arial" panose="020B0604020202020204" pitchFamily="34" charset="0"/>
+              </a:rPr>
               <a:t>1) (4</a:t>
             </a:r>
             <a:r>
-              <a:rPr lang="es-ES_tradnl" sz="900" i="1" dirty="0"/>
+              <a:rPr lang="es-ES_tradnl" sz="800" i="1" dirty="0">
+                <a:latin typeface="Arial" panose="020B0604020202020204" pitchFamily="34" charset="0"/>
+                <a:cs typeface="Arial" panose="020B0604020202020204" pitchFamily="34" charset="0"/>
+              </a:rPr>
               <a:t>x</a:t>
             </a:r>
             <a:r>
-              <a:rPr lang="es-ES_tradnl" sz="900" i="1" baseline="30000" dirty="0"/>
+              <a:rPr lang="es-ES_tradnl" sz="800" i="1" baseline="30000" dirty="0">
+                <a:latin typeface="Arial" panose="020B0604020202020204" pitchFamily="34" charset="0"/>
+                <a:cs typeface="Arial" panose="020B0604020202020204" pitchFamily="34" charset="0"/>
+              </a:rPr>
               <a:t>2</a:t>
             </a:r>
             <a:r>
-              <a:rPr lang="es-ES_tradnl" sz="900" i="1" dirty="0"/>
+              <a:rPr lang="es-ES_tradnl" sz="800" i="1" dirty="0">
+                <a:latin typeface="Arial" panose="020B0604020202020204" pitchFamily="34" charset="0"/>
+                <a:cs typeface="Arial" panose="020B0604020202020204" pitchFamily="34" charset="0"/>
+              </a:rPr>
               <a:t> + </a:t>
             </a:r>
             <a:r>
-              <a:rPr lang="es-ES_tradnl" sz="900" dirty="0"/>
+              <a:rPr lang="es-ES_tradnl" sz="800" dirty="0">
+                <a:latin typeface="Arial" panose="020B0604020202020204" pitchFamily="34" charset="0"/>
+                <a:cs typeface="Arial" panose="020B0604020202020204" pitchFamily="34" charset="0"/>
+              </a:rPr>
               <a:t>2</a:t>
             </a:r>
             <a:r>
-              <a:rPr lang="es-ES_tradnl" sz="900" i="1" dirty="0"/>
+              <a:rPr lang="es-ES_tradnl" sz="800" i="1" dirty="0">
+                <a:latin typeface="Arial" panose="020B0604020202020204" pitchFamily="34" charset="0"/>
+                <a:cs typeface="Arial" panose="020B0604020202020204" pitchFamily="34" charset="0"/>
+              </a:rPr>
               <a:t>x +</a:t>
             </a:r>
             <a:r>
-              <a:rPr lang="es-ES_tradnl" sz="900" dirty="0"/>
+              <a:rPr lang="es-ES_tradnl" sz="800" dirty="0">
+                <a:latin typeface="Arial" panose="020B0604020202020204" pitchFamily="34" charset="0"/>
+                <a:cs typeface="Arial" panose="020B0604020202020204" pitchFamily="34" charset="0"/>
+              </a:rPr>
               <a:t> 1</a:t>
             </a:r>
             <a:r>
-              <a:rPr lang="es-ES_tradnl" sz="900" dirty="0" smtClean="0"/>
+              <a:rPr lang="es-ES_tradnl" sz="800" dirty="0" smtClean="0">
+                <a:latin typeface="Arial" panose="020B0604020202020204" pitchFamily="34" charset="0"/>
+                <a:cs typeface="Arial" panose="020B0604020202020204" pitchFamily="34" charset="0"/>
+              </a:rPr>
               <a:t>)</a:t>
             </a:r>
           </a:p>
           <a:p>
             <a:r>
-              <a:rPr lang="es-ES_tradnl" sz="900" dirty="0" smtClean="0"/>
+              <a:rPr lang="es-ES_tradnl" sz="800" dirty="0" smtClean="0">
+                <a:latin typeface="Arial" panose="020B0604020202020204" pitchFamily="34" charset="0"/>
+                <a:cs typeface="Arial" panose="020B0604020202020204" pitchFamily="34" charset="0"/>
+              </a:rPr>
               <a:t>27 </a:t>
             </a:r>
             <a:r>
-              <a:rPr lang="es-ES_tradnl" sz="900" dirty="0"/>
+              <a:rPr lang="es-ES_tradnl" sz="800" dirty="0">
+                <a:latin typeface="Arial" panose="020B0604020202020204" pitchFamily="34" charset="0"/>
+                <a:cs typeface="Arial" panose="020B0604020202020204" pitchFamily="34" charset="0"/>
+              </a:rPr>
               <a:t>+ </a:t>
             </a:r>
             <a:r>
-              <a:rPr lang="es-ES_tradnl" sz="900" i="1" dirty="0"/>
+              <a:rPr lang="es-ES_tradnl" sz="800" i="1" dirty="0">
+                <a:latin typeface="Arial" panose="020B0604020202020204" pitchFamily="34" charset="0"/>
+                <a:cs typeface="Arial" panose="020B0604020202020204" pitchFamily="34" charset="0"/>
+              </a:rPr>
               <a:t>8y</a:t>
             </a:r>
             <a:r>
-              <a:rPr lang="es-ES_tradnl" sz="900" i="1" baseline="30000" dirty="0"/>
+              <a:rPr lang="es-ES_tradnl" sz="800" i="1" baseline="30000" dirty="0">
+                <a:latin typeface="Arial" panose="020B0604020202020204" pitchFamily="34" charset="0"/>
+                <a:cs typeface="Arial" panose="020B0604020202020204" pitchFamily="34" charset="0"/>
+              </a:rPr>
               <a:t>3 </a:t>
             </a:r>
             <a:r>
-              <a:rPr lang="es-ES_tradnl" sz="900" i="1" dirty="0"/>
+              <a:rPr lang="es-ES_tradnl" sz="800" i="1" dirty="0">
+                <a:latin typeface="Arial" panose="020B0604020202020204" pitchFamily="34" charset="0"/>
+                <a:cs typeface="Arial" panose="020B0604020202020204" pitchFamily="34" charset="0"/>
+              </a:rPr>
               <a:t>= </a:t>
             </a:r>
             <a:r>
-              <a:rPr lang="es-ES_tradnl" sz="900" dirty="0"/>
+              <a:rPr lang="es-ES_tradnl" sz="800" dirty="0">
+                <a:latin typeface="Arial" panose="020B0604020202020204" pitchFamily="34" charset="0"/>
+                <a:cs typeface="Arial" panose="020B0604020202020204" pitchFamily="34" charset="0"/>
+              </a:rPr>
               <a:t>(3 +2</a:t>
             </a:r>
             <a:r>
-              <a:rPr lang="es-ES_tradnl" sz="900" i="1" dirty="0"/>
+              <a:rPr lang="es-ES_tradnl" sz="800" i="1" dirty="0">
+                <a:latin typeface="Arial" panose="020B0604020202020204" pitchFamily="34" charset="0"/>
+                <a:cs typeface="Arial" panose="020B0604020202020204" pitchFamily="34" charset="0"/>
+              </a:rPr>
               <a:t>y</a:t>
             </a:r>
             <a:r>
-              <a:rPr lang="es-ES_tradnl" sz="900" dirty="0"/>
+              <a:rPr lang="es-ES_tradnl" sz="800" dirty="0">
+                <a:latin typeface="Arial" panose="020B0604020202020204" pitchFamily="34" charset="0"/>
+                <a:cs typeface="Arial" panose="020B0604020202020204" pitchFamily="34" charset="0"/>
+              </a:rPr>
               <a:t>) (9 – 6</a:t>
             </a:r>
             <a:r>
-              <a:rPr lang="es-ES_tradnl" sz="900" i="1" dirty="0"/>
+              <a:rPr lang="es-ES_tradnl" sz="800" i="1" dirty="0">
+                <a:latin typeface="Arial" panose="020B0604020202020204" pitchFamily="34" charset="0"/>
+                <a:cs typeface="Arial" panose="020B0604020202020204" pitchFamily="34" charset="0"/>
+              </a:rPr>
               <a:t>y + </a:t>
             </a:r>
             <a:r>
-              <a:rPr lang="es-ES_tradnl" sz="900" dirty="0"/>
+              <a:rPr lang="es-ES_tradnl" sz="800" dirty="0">
+                <a:latin typeface="Arial" panose="020B0604020202020204" pitchFamily="34" charset="0"/>
+                <a:cs typeface="Arial" panose="020B0604020202020204" pitchFamily="34" charset="0"/>
+              </a:rPr>
               <a:t>4</a:t>
             </a:r>
             <a:r>
-              <a:rPr lang="es-ES_tradnl" sz="900" i="1" dirty="0"/>
+              <a:rPr lang="es-ES_tradnl" sz="800" i="1" dirty="0">
+                <a:latin typeface="Arial" panose="020B0604020202020204" pitchFamily="34" charset="0"/>
+                <a:cs typeface="Arial" panose="020B0604020202020204" pitchFamily="34" charset="0"/>
+              </a:rPr>
               <a:t>y</a:t>
             </a:r>
             <a:r>
-              <a:rPr lang="es-ES_tradnl" sz="900" i="1" baseline="30000" dirty="0"/>
+              <a:rPr lang="es-ES_tradnl" sz="800" i="1" baseline="30000" dirty="0">
+                <a:latin typeface="Arial" panose="020B0604020202020204" pitchFamily="34" charset="0"/>
+                <a:cs typeface="Arial" panose="020B0604020202020204" pitchFamily="34" charset="0"/>
+              </a:rPr>
               <a:t>2</a:t>
             </a:r>
             <a:r>
-              <a:rPr lang="es-ES_tradnl" sz="900" dirty="0"/>
+              <a:rPr lang="es-ES_tradnl" sz="800" dirty="0">
+                <a:latin typeface="Arial" panose="020B0604020202020204" pitchFamily="34" charset="0"/>
+                <a:cs typeface="Arial" panose="020B0604020202020204" pitchFamily="34" charset="0"/>
+              </a:rPr>
               <a:t>)</a:t>
             </a:r>
-            <a:endParaRPr lang="es-CO" sz="900" dirty="0"/>
+            <a:endParaRPr lang="es-CO" sz="800" dirty="0">
+              <a:latin typeface="Arial" panose="020B0604020202020204" pitchFamily="34" charset="0"/>
+              <a:cs typeface="Arial" panose="020B0604020202020204" pitchFamily="34" charset="0"/>
+            </a:endParaRPr>
           </a:p>
         </p:txBody>
       </p:sp>
@@ -3599,7 +3818,7 @@
         </p:nvSpPr>
         <p:spPr>
           <a:xfrm>
-            <a:off x="6296276" y="3292441"/>
+            <a:off x="6251020" y="3711798"/>
             <a:ext cx="1122431" cy="353519"/>
           </a:xfrm>
           <a:prstGeom prst="rect">
@@ -3633,62 +3852,107 @@
           <a:lstStyle/>
           <a:p>
             <a:r>
-              <a:rPr lang="es-ES_tradnl" sz="900" dirty="0"/>
+              <a:rPr lang="es-ES_tradnl" sz="800" dirty="0">
+                <a:latin typeface="Arial" panose="020B0604020202020204" pitchFamily="34" charset="0"/>
+                <a:cs typeface="Arial" panose="020B0604020202020204" pitchFamily="34" charset="0"/>
+              </a:rPr>
               <a:t>8</a:t>
             </a:r>
             <a:r>
-              <a:rPr lang="es-ES_tradnl" sz="900" i="1" dirty="0"/>
+              <a:rPr lang="es-ES_tradnl" sz="800" i="1" dirty="0">
+                <a:latin typeface="Arial" panose="020B0604020202020204" pitchFamily="34" charset="0"/>
+                <a:cs typeface="Arial" panose="020B0604020202020204" pitchFamily="34" charset="0"/>
+              </a:rPr>
               <a:t>x</a:t>
             </a:r>
             <a:r>
-              <a:rPr lang="es-ES_tradnl" sz="900" i="1" baseline="30000" dirty="0"/>
+              <a:rPr lang="es-ES_tradnl" sz="800" i="1" baseline="30000" dirty="0">
+                <a:latin typeface="Arial" panose="020B0604020202020204" pitchFamily="34" charset="0"/>
+                <a:cs typeface="Arial" panose="020B0604020202020204" pitchFamily="34" charset="0"/>
+              </a:rPr>
               <a:t>3</a:t>
             </a:r>
             <a:r>
-              <a:rPr lang="es-ES_tradnl" sz="900" i="1" dirty="0"/>
+              <a:rPr lang="es-ES_tradnl" sz="800" i="1" dirty="0">
+                <a:latin typeface="Arial" panose="020B0604020202020204" pitchFamily="34" charset="0"/>
+                <a:cs typeface="Arial" panose="020B0604020202020204" pitchFamily="34" charset="0"/>
+              </a:rPr>
               <a:t> + </a:t>
             </a:r>
             <a:r>
-              <a:rPr lang="es-ES_tradnl" sz="900" dirty="0"/>
+              <a:rPr lang="es-ES_tradnl" sz="800" dirty="0">
+                <a:latin typeface="Arial" panose="020B0604020202020204" pitchFamily="34" charset="0"/>
+                <a:cs typeface="Arial" panose="020B0604020202020204" pitchFamily="34" charset="0"/>
+              </a:rPr>
               <a:t>12</a:t>
             </a:r>
             <a:r>
-              <a:rPr lang="es-ES_tradnl" sz="900" i="1" dirty="0"/>
+              <a:rPr lang="es-ES_tradnl" sz="800" i="1" dirty="0">
+                <a:latin typeface="Arial" panose="020B0604020202020204" pitchFamily="34" charset="0"/>
+                <a:cs typeface="Arial" panose="020B0604020202020204" pitchFamily="34" charset="0"/>
+              </a:rPr>
               <a:t>x</a:t>
             </a:r>
             <a:r>
-              <a:rPr lang="es-ES_tradnl" sz="900" i="1" baseline="30000" dirty="0"/>
+              <a:rPr lang="es-ES_tradnl" sz="800" i="1" baseline="30000" dirty="0">
+                <a:latin typeface="Arial" panose="020B0604020202020204" pitchFamily="34" charset="0"/>
+                <a:cs typeface="Arial" panose="020B0604020202020204" pitchFamily="34" charset="0"/>
+              </a:rPr>
               <a:t>2</a:t>
             </a:r>
             <a:r>
-              <a:rPr lang="es-ES_tradnl" sz="900" i="1" dirty="0"/>
+              <a:rPr lang="es-ES_tradnl" sz="800" i="1" dirty="0">
+                <a:latin typeface="Arial" panose="020B0604020202020204" pitchFamily="34" charset="0"/>
+                <a:cs typeface="Arial" panose="020B0604020202020204" pitchFamily="34" charset="0"/>
+              </a:rPr>
               <a:t> + </a:t>
             </a:r>
             <a:r>
-              <a:rPr lang="es-ES_tradnl" sz="900" dirty="0"/>
+              <a:rPr lang="es-ES_tradnl" sz="800" dirty="0">
+                <a:latin typeface="Arial" panose="020B0604020202020204" pitchFamily="34" charset="0"/>
+                <a:cs typeface="Arial" panose="020B0604020202020204" pitchFamily="34" charset="0"/>
+              </a:rPr>
               <a:t>12</a:t>
             </a:r>
             <a:r>
-              <a:rPr lang="es-ES_tradnl" sz="900" i="1" dirty="0"/>
+              <a:rPr lang="es-ES_tradnl" sz="800" i="1" dirty="0">
+                <a:latin typeface="Arial" panose="020B0604020202020204" pitchFamily="34" charset="0"/>
+                <a:cs typeface="Arial" panose="020B0604020202020204" pitchFamily="34" charset="0"/>
+              </a:rPr>
               <a:t>x + </a:t>
             </a:r>
             <a:r>
-              <a:rPr lang="es-ES_tradnl" sz="900" dirty="0"/>
+              <a:rPr lang="es-ES_tradnl" sz="800" dirty="0">
+                <a:latin typeface="Arial" panose="020B0604020202020204" pitchFamily="34" charset="0"/>
+                <a:cs typeface="Arial" panose="020B0604020202020204" pitchFamily="34" charset="0"/>
+              </a:rPr>
               <a:t>1 = (2</a:t>
             </a:r>
             <a:r>
-              <a:rPr lang="es-ES_tradnl" sz="900" i="1" dirty="0"/>
+              <a:rPr lang="es-ES_tradnl" sz="800" i="1" dirty="0">
+                <a:latin typeface="Arial" panose="020B0604020202020204" pitchFamily="34" charset="0"/>
+                <a:cs typeface="Arial" panose="020B0604020202020204" pitchFamily="34" charset="0"/>
+              </a:rPr>
               <a:t>x</a:t>
             </a:r>
             <a:r>
-              <a:rPr lang="es-ES_tradnl" sz="900" dirty="0"/>
+              <a:rPr lang="es-ES_tradnl" sz="800" dirty="0">
+                <a:latin typeface="Arial" panose="020B0604020202020204" pitchFamily="34" charset="0"/>
+                <a:cs typeface="Arial" panose="020B0604020202020204" pitchFamily="34" charset="0"/>
+              </a:rPr>
               <a:t> + 1)</a:t>
             </a:r>
             <a:r>
-              <a:rPr lang="es-ES_tradnl" sz="900" baseline="30000" dirty="0"/>
+              <a:rPr lang="es-ES_tradnl" sz="800" baseline="30000" dirty="0">
+                <a:latin typeface="Arial" panose="020B0604020202020204" pitchFamily="34" charset="0"/>
+                <a:cs typeface="Arial" panose="020B0604020202020204" pitchFamily="34" charset="0"/>
+              </a:rPr>
               <a:t>3</a:t>
             </a:r>
-            <a:endParaRPr lang="es-CO" sz="900" dirty="0"/>
+            <a:endParaRPr lang="es-CO" sz="800" dirty="0">
+              <a:latin typeface="Arial" panose="020B0604020202020204" pitchFamily="34" charset="0"/>
+              <a:cs typeface="Arial" panose="020B0604020202020204" pitchFamily="34" charset="0"/>
+            </a:endParaRPr>
           </a:p>
         </p:txBody>
       </p:sp>
@@ -3700,7 +3964,7 @@
         </p:nvSpPr>
         <p:spPr>
           <a:xfrm>
-            <a:off x="7385438" y="3714011"/>
+            <a:off x="7340182" y="4133368"/>
             <a:ext cx="2242694" cy="353519"/>
           </a:xfrm>
           <a:prstGeom prst="rect">
@@ -3735,129 +3999,221 @@
           <a:p>
             <a:pPr algn="ctr"/>
             <a:r>
-              <a:rPr lang="es-ES_tradnl" sz="900" i="1" dirty="0"/>
+              <a:rPr lang="es-ES_tradnl" sz="1000" i="1" dirty="0">
+                <a:latin typeface="Arial" panose="020B0604020202020204" pitchFamily="34" charset="0"/>
+                <a:cs typeface="Arial" panose="020B0604020202020204" pitchFamily="34" charset="0"/>
+              </a:rPr>
               <a:t>x</a:t>
             </a:r>
             <a:r>
-              <a:rPr lang="es-ES_tradnl" sz="900" i="1" baseline="30000" dirty="0"/>
+              <a:rPr lang="es-ES_tradnl" sz="1000" i="1" baseline="30000" dirty="0">
+                <a:latin typeface="Arial" panose="020B0604020202020204" pitchFamily="34" charset="0"/>
+                <a:cs typeface="Arial" panose="020B0604020202020204" pitchFamily="34" charset="0"/>
+              </a:rPr>
               <a:t>7</a:t>
             </a:r>
             <a:r>
-              <a:rPr lang="es-ES_tradnl" sz="900" i="1" dirty="0"/>
+              <a:rPr lang="es-ES_tradnl" sz="1000" i="1" dirty="0">
+                <a:latin typeface="Arial" panose="020B0604020202020204" pitchFamily="34" charset="0"/>
+                <a:cs typeface="Arial" panose="020B0604020202020204" pitchFamily="34" charset="0"/>
+              </a:rPr>
               <a:t> + </a:t>
             </a:r>
             <a:r>
-              <a:rPr lang="es-ES_tradnl" sz="900" dirty="0"/>
+              <a:rPr lang="es-ES_tradnl" sz="1000" dirty="0">
+                <a:latin typeface="Arial" panose="020B0604020202020204" pitchFamily="34" charset="0"/>
+                <a:cs typeface="Arial" panose="020B0604020202020204" pitchFamily="34" charset="0"/>
+              </a:rPr>
               <a:t>128 = </a:t>
             </a:r>
-            <a:endParaRPr lang="es-ES_tradnl" sz="900" dirty="0" smtClean="0"/>
+            <a:endParaRPr lang="es-ES_tradnl" sz="1000" dirty="0" smtClean="0">
+              <a:latin typeface="Arial" panose="020B0604020202020204" pitchFamily="34" charset="0"/>
+              <a:cs typeface="Arial" panose="020B0604020202020204" pitchFamily="34" charset="0"/>
+            </a:endParaRPr>
           </a:p>
           <a:p>
             <a:pPr algn="ctr"/>
             <a:r>
-              <a:rPr lang="es-ES_tradnl" sz="900" dirty="0"/>
+              <a:rPr lang="es-ES_tradnl" sz="1000" dirty="0">
+                <a:latin typeface="Arial" panose="020B0604020202020204" pitchFamily="34" charset="0"/>
+                <a:cs typeface="Arial" panose="020B0604020202020204" pitchFamily="34" charset="0"/>
+              </a:rPr>
               <a:t>(</a:t>
             </a:r>
             <a:r>
-              <a:rPr lang="es-ES_tradnl" sz="900" i="1" dirty="0"/>
+              <a:rPr lang="es-ES_tradnl" sz="1000" i="1" dirty="0">
+                <a:latin typeface="Arial" panose="020B0604020202020204" pitchFamily="34" charset="0"/>
+                <a:cs typeface="Arial" panose="020B0604020202020204" pitchFamily="34" charset="0"/>
+              </a:rPr>
               <a:t>x +</a:t>
             </a:r>
             <a:r>
-              <a:rPr lang="es-ES_tradnl" sz="900" dirty="0"/>
+              <a:rPr lang="es-ES_tradnl" sz="1000" dirty="0">
+                <a:latin typeface="Arial" panose="020B0604020202020204" pitchFamily="34" charset="0"/>
+                <a:cs typeface="Arial" panose="020B0604020202020204" pitchFamily="34" charset="0"/>
+              </a:rPr>
               <a:t> 2) (</a:t>
             </a:r>
             <a:r>
-              <a:rPr lang="es-ES_tradnl" sz="900" i="1" dirty="0"/>
+              <a:rPr lang="es-ES_tradnl" sz="1000" i="1" dirty="0">
+                <a:latin typeface="Arial" panose="020B0604020202020204" pitchFamily="34" charset="0"/>
+                <a:cs typeface="Arial" panose="020B0604020202020204" pitchFamily="34" charset="0"/>
+              </a:rPr>
               <a:t>x</a:t>
             </a:r>
             <a:r>
-              <a:rPr lang="es-ES_tradnl" sz="900" i="1" baseline="30000" dirty="0"/>
+              <a:rPr lang="es-ES_tradnl" sz="1000" i="1" baseline="30000" dirty="0">
+                <a:latin typeface="Arial" panose="020B0604020202020204" pitchFamily="34" charset="0"/>
+                <a:cs typeface="Arial" panose="020B0604020202020204" pitchFamily="34" charset="0"/>
+              </a:rPr>
               <a:t>6</a:t>
             </a:r>
             <a:r>
-              <a:rPr lang="es-ES_tradnl" sz="900" i="1" dirty="0"/>
+              <a:rPr lang="es-ES_tradnl" sz="1000" i="1" dirty="0">
+                <a:latin typeface="Arial" panose="020B0604020202020204" pitchFamily="34" charset="0"/>
+                <a:cs typeface="Arial" panose="020B0604020202020204" pitchFamily="34" charset="0"/>
+              </a:rPr>
               <a:t> – </a:t>
             </a:r>
             <a:r>
-              <a:rPr lang="es-ES_tradnl" sz="900" dirty="0"/>
+              <a:rPr lang="es-ES_tradnl" sz="1000" dirty="0">
+                <a:latin typeface="Arial" panose="020B0604020202020204" pitchFamily="34" charset="0"/>
+                <a:cs typeface="Arial" panose="020B0604020202020204" pitchFamily="34" charset="0"/>
+              </a:rPr>
               <a:t>2</a:t>
             </a:r>
             <a:r>
-              <a:rPr lang="es-ES_tradnl" sz="900" i="1" dirty="0"/>
+              <a:rPr lang="es-ES_tradnl" sz="1000" i="1" dirty="0">
+                <a:latin typeface="Arial" panose="020B0604020202020204" pitchFamily="34" charset="0"/>
+                <a:cs typeface="Arial" panose="020B0604020202020204" pitchFamily="34" charset="0"/>
+              </a:rPr>
               <a:t>x</a:t>
             </a:r>
             <a:r>
-              <a:rPr lang="es-ES_tradnl" sz="900" i="1" baseline="30000" dirty="0"/>
+              <a:rPr lang="es-ES_tradnl" sz="1000" i="1" baseline="30000" dirty="0">
+                <a:latin typeface="Arial" panose="020B0604020202020204" pitchFamily="34" charset="0"/>
+                <a:cs typeface="Arial" panose="020B0604020202020204" pitchFamily="34" charset="0"/>
+              </a:rPr>
               <a:t>5</a:t>
             </a:r>
             <a:r>
-              <a:rPr lang="es-ES_tradnl" sz="900" i="1" dirty="0"/>
+              <a:rPr lang="es-ES_tradnl" sz="1000" i="1" dirty="0">
+                <a:latin typeface="Arial" panose="020B0604020202020204" pitchFamily="34" charset="0"/>
+                <a:cs typeface="Arial" panose="020B0604020202020204" pitchFamily="34" charset="0"/>
+              </a:rPr>
               <a:t> + </a:t>
             </a:r>
             <a:r>
-              <a:rPr lang="es-ES_tradnl" sz="900" dirty="0"/>
+              <a:rPr lang="es-ES_tradnl" sz="1000" dirty="0">
+                <a:latin typeface="Arial" panose="020B0604020202020204" pitchFamily="34" charset="0"/>
+                <a:cs typeface="Arial" panose="020B0604020202020204" pitchFamily="34" charset="0"/>
+              </a:rPr>
               <a:t>4</a:t>
             </a:r>
             <a:r>
-              <a:rPr lang="es-ES_tradnl" sz="900" i="1" dirty="0"/>
+              <a:rPr lang="es-ES_tradnl" sz="1000" i="1" dirty="0">
+                <a:latin typeface="Arial" panose="020B0604020202020204" pitchFamily="34" charset="0"/>
+                <a:cs typeface="Arial" panose="020B0604020202020204" pitchFamily="34" charset="0"/>
+              </a:rPr>
               <a:t>x</a:t>
             </a:r>
             <a:r>
-              <a:rPr lang="es-ES_tradnl" sz="900" i="1" baseline="30000" dirty="0"/>
+              <a:rPr lang="es-ES_tradnl" sz="1000" i="1" baseline="30000" dirty="0">
+                <a:latin typeface="Arial" panose="020B0604020202020204" pitchFamily="34" charset="0"/>
+                <a:cs typeface="Arial" panose="020B0604020202020204" pitchFamily="34" charset="0"/>
+              </a:rPr>
               <a:t>4</a:t>
             </a:r>
             <a:r>
-              <a:rPr lang="es-ES_tradnl" sz="900" i="1" dirty="0"/>
+              <a:rPr lang="es-ES_tradnl" sz="1000" i="1" dirty="0">
+                <a:latin typeface="Arial" panose="020B0604020202020204" pitchFamily="34" charset="0"/>
+                <a:cs typeface="Arial" panose="020B0604020202020204" pitchFamily="34" charset="0"/>
+              </a:rPr>
               <a:t> – </a:t>
             </a:r>
             <a:r>
-              <a:rPr lang="es-ES_tradnl" sz="900" dirty="0"/>
+              <a:rPr lang="es-ES_tradnl" sz="1000" dirty="0">
+                <a:latin typeface="Arial" panose="020B0604020202020204" pitchFamily="34" charset="0"/>
+                <a:cs typeface="Arial" panose="020B0604020202020204" pitchFamily="34" charset="0"/>
+              </a:rPr>
               <a:t>8</a:t>
             </a:r>
             <a:r>
-              <a:rPr lang="es-ES_tradnl" sz="900" i="1" dirty="0"/>
+              <a:rPr lang="es-ES_tradnl" sz="1000" i="1" dirty="0">
+                <a:latin typeface="Arial" panose="020B0604020202020204" pitchFamily="34" charset="0"/>
+                <a:cs typeface="Arial" panose="020B0604020202020204" pitchFamily="34" charset="0"/>
+              </a:rPr>
               <a:t>x</a:t>
             </a:r>
             <a:r>
-              <a:rPr lang="es-ES_tradnl" sz="900" i="1" baseline="30000" dirty="0"/>
+              <a:rPr lang="es-ES_tradnl" sz="1000" i="1" baseline="30000" dirty="0">
+                <a:latin typeface="Arial" panose="020B0604020202020204" pitchFamily="34" charset="0"/>
+                <a:cs typeface="Arial" panose="020B0604020202020204" pitchFamily="34" charset="0"/>
+              </a:rPr>
               <a:t>3</a:t>
             </a:r>
             <a:r>
-              <a:rPr lang="es-ES_tradnl" sz="900" i="1" dirty="0"/>
+              <a:rPr lang="es-ES_tradnl" sz="1000" i="1" dirty="0">
+                <a:latin typeface="Arial" panose="020B0604020202020204" pitchFamily="34" charset="0"/>
+                <a:cs typeface="Arial" panose="020B0604020202020204" pitchFamily="34" charset="0"/>
+              </a:rPr>
               <a:t> </a:t>
             </a:r>
             <a:r>
-              <a:rPr lang="es-ES_tradnl" sz="900" dirty="0"/>
+              <a:rPr lang="es-ES_tradnl" sz="1000" dirty="0">
+                <a:latin typeface="Arial" panose="020B0604020202020204" pitchFamily="34" charset="0"/>
+                <a:cs typeface="Arial" panose="020B0604020202020204" pitchFamily="34" charset="0"/>
+              </a:rPr>
               <a:t>+ 16</a:t>
             </a:r>
             <a:r>
-              <a:rPr lang="es-ES_tradnl" sz="900" i="1" dirty="0"/>
+              <a:rPr lang="es-ES_tradnl" sz="1000" i="1" dirty="0">
+                <a:latin typeface="Arial" panose="020B0604020202020204" pitchFamily="34" charset="0"/>
+                <a:cs typeface="Arial" panose="020B0604020202020204" pitchFamily="34" charset="0"/>
+              </a:rPr>
               <a:t>x</a:t>
             </a:r>
             <a:r>
-              <a:rPr lang="es-ES_tradnl" sz="900" i="1" baseline="30000" dirty="0"/>
+              <a:rPr lang="es-ES_tradnl" sz="1000" i="1" baseline="30000" dirty="0">
+                <a:latin typeface="Arial" panose="020B0604020202020204" pitchFamily="34" charset="0"/>
+                <a:cs typeface="Arial" panose="020B0604020202020204" pitchFamily="34" charset="0"/>
+              </a:rPr>
               <a:t>2</a:t>
             </a:r>
             <a:r>
-              <a:rPr lang="es-ES_tradnl" sz="900" i="1" dirty="0"/>
+              <a:rPr lang="es-ES_tradnl" sz="1000" i="1" dirty="0">
+                <a:latin typeface="Arial" panose="020B0604020202020204" pitchFamily="34" charset="0"/>
+                <a:cs typeface="Arial" panose="020B0604020202020204" pitchFamily="34" charset="0"/>
+              </a:rPr>
               <a:t> – </a:t>
             </a:r>
             <a:r>
-              <a:rPr lang="es-ES_tradnl" sz="900" dirty="0"/>
+              <a:rPr lang="es-ES_tradnl" sz="1000" dirty="0">
+                <a:latin typeface="Arial" panose="020B0604020202020204" pitchFamily="34" charset="0"/>
+                <a:cs typeface="Arial" panose="020B0604020202020204" pitchFamily="34" charset="0"/>
+              </a:rPr>
               <a:t>32</a:t>
             </a:r>
             <a:r>
-              <a:rPr lang="es-ES_tradnl" sz="900" i="1" dirty="0"/>
+              <a:rPr lang="es-ES_tradnl" sz="1000" i="1" dirty="0">
+                <a:latin typeface="Arial" panose="020B0604020202020204" pitchFamily="34" charset="0"/>
+                <a:cs typeface="Arial" panose="020B0604020202020204" pitchFamily="34" charset="0"/>
+              </a:rPr>
               <a:t>x + </a:t>
             </a:r>
             <a:r>
-              <a:rPr lang="es-ES_tradnl" sz="900" dirty="0"/>
+              <a:rPr lang="es-ES_tradnl" sz="1000" dirty="0">
+                <a:latin typeface="Arial" panose="020B0604020202020204" pitchFamily="34" charset="0"/>
+                <a:cs typeface="Arial" panose="020B0604020202020204" pitchFamily="34" charset="0"/>
+              </a:rPr>
               <a:t>64)</a:t>
             </a:r>
-            <a:endParaRPr lang="es-ES" sz="900" dirty="0">
+            <a:endParaRPr lang="es-ES" sz="1000" dirty="0">
               <a:solidFill>
                 <a:schemeClr val="tx1"/>
               </a:solidFill>
+              <a:latin typeface="Arial" panose="020B0604020202020204" pitchFamily="34" charset="0"/>
+              <a:cs typeface="Arial" panose="020B0604020202020204" pitchFamily="34" charset="0"/>
             </a:endParaRPr>
           </a:p>
         </p:txBody>
@@ -3870,7 +4226,7 @@
         </p:nvSpPr>
         <p:spPr>
           <a:xfrm>
-            <a:off x="2904137" y="5880935"/>
+            <a:off x="2858881" y="6300292"/>
             <a:ext cx="1122431" cy="353519"/>
           </a:xfrm>
           <a:prstGeom prst="rect">
@@ -3904,70 +4260,121 @@
           <a:lstStyle/>
           <a:p>
             <a:r>
-              <a:rPr lang="es-ES_tradnl" sz="900" dirty="0"/>
+              <a:rPr lang="es-ES_tradnl" sz="1000" dirty="0">
+                <a:latin typeface="Arial" panose="020B0604020202020204" pitchFamily="34" charset="0"/>
+                <a:cs typeface="Arial" panose="020B0604020202020204" pitchFamily="34" charset="0"/>
+              </a:rPr>
               <a:t>9</a:t>
             </a:r>
             <a:r>
-              <a:rPr lang="es-ES_tradnl" sz="900" i="1" dirty="0"/>
+              <a:rPr lang="es-ES_tradnl" sz="1000" i="1" dirty="0">
+                <a:latin typeface="Arial" panose="020B0604020202020204" pitchFamily="34" charset="0"/>
+                <a:cs typeface="Arial" panose="020B0604020202020204" pitchFamily="34" charset="0"/>
+              </a:rPr>
               <a:t>x</a:t>
             </a:r>
             <a:r>
-              <a:rPr lang="es-ES_tradnl" sz="900" i="1" baseline="30000" dirty="0"/>
+              <a:rPr lang="es-ES_tradnl" sz="1000" i="1" baseline="30000" dirty="0">
+                <a:latin typeface="Arial" panose="020B0604020202020204" pitchFamily="34" charset="0"/>
+                <a:cs typeface="Arial" panose="020B0604020202020204" pitchFamily="34" charset="0"/>
+              </a:rPr>
               <a:t>2</a:t>
             </a:r>
             <a:r>
-              <a:rPr lang="es-ES_tradnl" sz="900" i="1" dirty="0"/>
+              <a:rPr lang="es-ES_tradnl" sz="1000" i="1" dirty="0">
+                <a:latin typeface="Arial" panose="020B0604020202020204" pitchFamily="34" charset="0"/>
+                <a:cs typeface="Arial" panose="020B0604020202020204" pitchFamily="34" charset="0"/>
+              </a:rPr>
               <a:t> + </a:t>
             </a:r>
             <a:r>
-              <a:rPr lang="es-ES_tradnl" sz="900" dirty="0"/>
+              <a:rPr lang="es-ES_tradnl" sz="1000" dirty="0">
+                <a:latin typeface="Arial" panose="020B0604020202020204" pitchFamily="34" charset="0"/>
+                <a:cs typeface="Arial" panose="020B0604020202020204" pitchFamily="34" charset="0"/>
+              </a:rPr>
               <a:t>24</a:t>
             </a:r>
             <a:r>
-              <a:rPr lang="es-ES_tradnl" sz="900" i="1" dirty="0"/>
+              <a:rPr lang="es-ES_tradnl" sz="1000" i="1" dirty="0">
+                <a:latin typeface="Arial" panose="020B0604020202020204" pitchFamily="34" charset="0"/>
+                <a:cs typeface="Arial" panose="020B0604020202020204" pitchFamily="34" charset="0"/>
+              </a:rPr>
               <a:t>xy + </a:t>
             </a:r>
             <a:r>
-              <a:rPr lang="es-ES_tradnl" sz="900" dirty="0"/>
+              <a:rPr lang="es-ES_tradnl" sz="1000" dirty="0">
+                <a:latin typeface="Arial" panose="020B0604020202020204" pitchFamily="34" charset="0"/>
+                <a:cs typeface="Arial" panose="020B0604020202020204" pitchFamily="34" charset="0"/>
+              </a:rPr>
               <a:t>16</a:t>
             </a:r>
             <a:r>
-              <a:rPr lang="es-ES_tradnl" sz="900" i="1" dirty="0"/>
+              <a:rPr lang="es-ES_tradnl" sz="1000" i="1" dirty="0">
+                <a:latin typeface="Arial" panose="020B0604020202020204" pitchFamily="34" charset="0"/>
+                <a:cs typeface="Arial" panose="020B0604020202020204" pitchFamily="34" charset="0"/>
+              </a:rPr>
               <a:t>y</a:t>
             </a:r>
             <a:r>
-              <a:rPr lang="es-ES_tradnl" sz="900" i="1" baseline="30000" dirty="0"/>
+              <a:rPr lang="es-ES_tradnl" sz="1000" i="1" baseline="30000" dirty="0">
+                <a:latin typeface="Arial" panose="020B0604020202020204" pitchFamily="34" charset="0"/>
+                <a:cs typeface="Arial" panose="020B0604020202020204" pitchFamily="34" charset="0"/>
+              </a:rPr>
               <a:t>2</a:t>
             </a:r>
             <a:r>
-              <a:rPr lang="es-ES_tradnl" sz="900" i="1" dirty="0"/>
+              <a:rPr lang="es-ES_tradnl" sz="1000" i="1" dirty="0">
+                <a:latin typeface="Arial" panose="020B0604020202020204" pitchFamily="34" charset="0"/>
+                <a:cs typeface="Arial" panose="020B0604020202020204" pitchFamily="34" charset="0"/>
+              </a:rPr>
               <a:t> = </a:t>
             </a:r>
             <a:r>
-              <a:rPr lang="es-ES_tradnl" sz="900" dirty="0"/>
+              <a:rPr lang="es-ES_tradnl" sz="1000" dirty="0">
+                <a:latin typeface="Arial" panose="020B0604020202020204" pitchFamily="34" charset="0"/>
+                <a:cs typeface="Arial" panose="020B0604020202020204" pitchFamily="34" charset="0"/>
+              </a:rPr>
               <a:t>(3</a:t>
             </a:r>
             <a:r>
-              <a:rPr lang="es-ES_tradnl" sz="900" i="1" dirty="0"/>
+              <a:rPr lang="es-ES_tradnl" sz="1000" i="1" dirty="0">
+                <a:latin typeface="Arial" panose="020B0604020202020204" pitchFamily="34" charset="0"/>
+                <a:cs typeface="Arial" panose="020B0604020202020204" pitchFamily="34" charset="0"/>
+              </a:rPr>
               <a:t>x</a:t>
             </a:r>
             <a:r>
-              <a:rPr lang="es-ES_tradnl" sz="900" dirty="0"/>
+              <a:rPr lang="es-ES_tradnl" sz="1000" dirty="0">
+                <a:latin typeface="Arial" panose="020B0604020202020204" pitchFamily="34" charset="0"/>
+                <a:cs typeface="Arial" panose="020B0604020202020204" pitchFamily="34" charset="0"/>
+              </a:rPr>
               <a:t> + 4</a:t>
             </a:r>
             <a:r>
-              <a:rPr lang="es-ES_tradnl" sz="900" i="1" dirty="0"/>
+              <a:rPr lang="es-ES_tradnl" sz="1000" i="1" dirty="0">
+                <a:latin typeface="Arial" panose="020B0604020202020204" pitchFamily="34" charset="0"/>
+                <a:cs typeface="Arial" panose="020B0604020202020204" pitchFamily="34" charset="0"/>
+              </a:rPr>
               <a:t>y</a:t>
             </a:r>
             <a:r>
-              <a:rPr lang="es-ES_tradnl" sz="900" dirty="0"/>
+              <a:rPr lang="es-ES_tradnl" sz="1000" dirty="0">
+                <a:latin typeface="Arial" panose="020B0604020202020204" pitchFamily="34" charset="0"/>
+                <a:cs typeface="Arial" panose="020B0604020202020204" pitchFamily="34" charset="0"/>
+              </a:rPr>
               <a:t>)</a:t>
             </a:r>
             <a:r>
-              <a:rPr lang="es-ES_tradnl" sz="900" baseline="30000" dirty="0"/>
+              <a:rPr lang="es-ES_tradnl" sz="1000" baseline="30000" dirty="0">
+                <a:latin typeface="Arial" panose="020B0604020202020204" pitchFamily="34" charset="0"/>
+                <a:cs typeface="Arial" panose="020B0604020202020204" pitchFamily="34" charset="0"/>
+              </a:rPr>
               <a:t>2</a:t>
             </a:r>
-            <a:endParaRPr lang="es-CO" sz="900" dirty="0"/>
+            <a:endParaRPr lang="es-CO" sz="1000" dirty="0">
+              <a:latin typeface="Arial" panose="020B0604020202020204" pitchFamily="34" charset="0"/>
+              <a:cs typeface="Arial" panose="020B0604020202020204" pitchFamily="34" charset="0"/>
+            </a:endParaRPr>
           </a:p>
         </p:txBody>
       </p:sp>
@@ -3979,8 +4386,8 @@
         </p:nvSpPr>
         <p:spPr>
           <a:xfrm>
-            <a:off x="2905892" y="5522170"/>
-            <a:ext cx="1117174" cy="230832"/>
+            <a:off x="2860636" y="5941527"/>
+            <a:ext cx="1117174" cy="215444"/>
           </a:xfrm>
           <a:prstGeom prst="rect">
             <a:avLst/>
@@ -3995,10 +4402,16 @@
           <a:p>
             <a:pPr algn="ctr"/>
             <a:r>
-              <a:rPr lang="es-ES" sz="900" dirty="0" smtClean="0"/>
+              <a:rPr lang="es-ES" sz="800" dirty="0" smtClean="0">
+                <a:latin typeface="Arial" panose="020B0604020202020204" pitchFamily="34" charset="0"/>
+                <a:cs typeface="Arial" panose="020B0604020202020204" pitchFamily="34" charset="0"/>
+              </a:rPr>
               <a:t>ejemplo</a:t>
             </a:r>
-            <a:endParaRPr lang="es-ES" sz="900" dirty="0"/>
+            <a:endParaRPr lang="es-ES" sz="800" dirty="0">
+              <a:latin typeface="Arial" panose="020B0604020202020204" pitchFamily="34" charset="0"/>
+              <a:cs typeface="Arial" panose="020B0604020202020204" pitchFamily="34" charset="0"/>
+            </a:endParaRPr>
           </a:p>
         </p:txBody>
       </p:sp>
@@ -4013,7 +4426,7 @@
         </p:nvCxnSpPr>
         <p:spPr>
           <a:xfrm rot="5400000">
-            <a:off x="3282402" y="5337582"/>
+            <a:off x="3237146" y="5756939"/>
             <a:ext cx="366665" cy="2510"/>
           </a:xfrm>
           <a:prstGeom prst="bentConnector3">
@@ -4053,8 +4466,8 @@
         </p:nvCxnSpPr>
         <p:spPr>
           <a:xfrm rot="16200000" flipH="1">
-            <a:off x="3400950" y="5816531"/>
-            <a:ext cx="127933" cy="874"/>
+            <a:off x="3348000" y="6228194"/>
+            <a:ext cx="143321" cy="874"/>
           </a:xfrm>
           <a:prstGeom prst="bentConnector3">
             <a:avLst>
@@ -4090,7 +4503,7 @@
         </p:nvSpPr>
         <p:spPr>
           <a:xfrm>
-            <a:off x="6733392" y="5836008"/>
+            <a:off x="6688136" y="6255365"/>
             <a:ext cx="1122431" cy="353519"/>
           </a:xfrm>
           <a:prstGeom prst="rect">
@@ -4124,60 +4537,102 @@
           <a:lstStyle/>
           <a:p>
             <a:r>
-              <a:rPr lang="es-ES_tradnl" sz="900" dirty="0"/>
+              <a:rPr lang="es-ES_tradnl" sz="1000" dirty="0">
+                <a:latin typeface="Arial" panose="020B0604020202020204" pitchFamily="34" charset="0"/>
+                <a:cs typeface="Arial" panose="020B0604020202020204" pitchFamily="34" charset="0"/>
+              </a:rPr>
               <a:t>5</a:t>
             </a:r>
             <a:r>
-              <a:rPr lang="es-ES_tradnl" sz="900" i="1" dirty="0"/>
+              <a:rPr lang="es-ES_tradnl" sz="1000" i="1" dirty="0">
+                <a:latin typeface="Arial" panose="020B0604020202020204" pitchFamily="34" charset="0"/>
+                <a:cs typeface="Arial" panose="020B0604020202020204" pitchFamily="34" charset="0"/>
+              </a:rPr>
               <a:t>x</a:t>
             </a:r>
             <a:r>
-              <a:rPr lang="es-ES_tradnl" sz="900" i="1" baseline="30000" dirty="0"/>
+              <a:rPr lang="es-ES_tradnl" sz="1000" i="1" baseline="30000" dirty="0">
+                <a:latin typeface="Arial" panose="020B0604020202020204" pitchFamily="34" charset="0"/>
+                <a:cs typeface="Arial" panose="020B0604020202020204" pitchFamily="34" charset="0"/>
+              </a:rPr>
               <a:t>2</a:t>
             </a:r>
             <a:r>
-              <a:rPr lang="es-ES_tradnl" sz="900" i="1" dirty="0"/>
+              <a:rPr lang="es-ES_tradnl" sz="1000" i="1" dirty="0">
+                <a:latin typeface="Arial" panose="020B0604020202020204" pitchFamily="34" charset="0"/>
+                <a:cs typeface="Arial" panose="020B0604020202020204" pitchFamily="34" charset="0"/>
+              </a:rPr>
               <a:t> +</a:t>
             </a:r>
             <a:r>
-              <a:rPr lang="es-ES_tradnl" sz="900" dirty="0"/>
+              <a:rPr lang="es-ES_tradnl" sz="1000" dirty="0">
+                <a:latin typeface="Arial" panose="020B0604020202020204" pitchFamily="34" charset="0"/>
+                <a:cs typeface="Arial" panose="020B0604020202020204" pitchFamily="34" charset="0"/>
+              </a:rPr>
               <a:t> 10</a:t>
             </a:r>
             <a:r>
-              <a:rPr lang="es-ES_tradnl" sz="900" i="1" dirty="0"/>
+              <a:rPr lang="es-ES_tradnl" sz="1000" i="1" dirty="0">
+                <a:latin typeface="Arial" panose="020B0604020202020204" pitchFamily="34" charset="0"/>
+                <a:cs typeface="Arial" panose="020B0604020202020204" pitchFamily="34" charset="0"/>
+              </a:rPr>
               <a:t>x +</a:t>
             </a:r>
             <a:r>
-              <a:rPr lang="es-ES_tradnl" sz="900" dirty="0"/>
+              <a:rPr lang="es-ES_tradnl" sz="1000" dirty="0">
+                <a:latin typeface="Arial" panose="020B0604020202020204" pitchFamily="34" charset="0"/>
+                <a:cs typeface="Arial" panose="020B0604020202020204" pitchFamily="34" charset="0"/>
+              </a:rPr>
               <a:t> 12 </a:t>
             </a:r>
             <a:r>
-              <a:rPr lang="es-ES_tradnl" sz="900" dirty="0" smtClean="0"/>
+              <a:rPr lang="es-ES_tradnl" sz="1000" dirty="0" smtClean="0">
+                <a:latin typeface="Arial" panose="020B0604020202020204" pitchFamily="34" charset="0"/>
+                <a:cs typeface="Arial" panose="020B0604020202020204" pitchFamily="34" charset="0"/>
+              </a:rPr>
               <a:t>=</a:t>
             </a:r>
           </a:p>
           <a:p>
             <a:r>
-              <a:rPr lang="es-ES_tradnl" sz="900" dirty="0" smtClean="0"/>
+              <a:rPr lang="es-ES_tradnl" sz="1000" dirty="0" smtClean="0">
+                <a:latin typeface="Arial" panose="020B0604020202020204" pitchFamily="34" charset="0"/>
+                <a:cs typeface="Arial" panose="020B0604020202020204" pitchFamily="34" charset="0"/>
+              </a:rPr>
               <a:t>(</a:t>
             </a:r>
             <a:r>
-              <a:rPr lang="es-ES_tradnl" sz="900" i="1" dirty="0"/>
+              <a:rPr lang="es-ES_tradnl" sz="1000" i="1" dirty="0">
+                <a:latin typeface="Arial" panose="020B0604020202020204" pitchFamily="34" charset="0"/>
+                <a:cs typeface="Arial" panose="020B0604020202020204" pitchFamily="34" charset="0"/>
+              </a:rPr>
               <a:t>x </a:t>
             </a:r>
             <a:r>
-              <a:rPr lang="es-ES_tradnl" sz="900" dirty="0"/>
+              <a:rPr lang="es-ES_tradnl" sz="1000" dirty="0">
+                <a:latin typeface="Arial" panose="020B0604020202020204" pitchFamily="34" charset="0"/>
+                <a:cs typeface="Arial" panose="020B0604020202020204" pitchFamily="34" charset="0"/>
+              </a:rPr>
               <a:t>+ 2) (5</a:t>
             </a:r>
             <a:r>
-              <a:rPr lang="es-ES_tradnl" sz="900" i="1" dirty="0"/>
+              <a:rPr lang="es-ES_tradnl" sz="1000" i="1" dirty="0">
+                <a:latin typeface="Arial" panose="020B0604020202020204" pitchFamily="34" charset="0"/>
+                <a:cs typeface="Arial" panose="020B0604020202020204" pitchFamily="34" charset="0"/>
+              </a:rPr>
               <a:t>x </a:t>
             </a:r>
             <a:r>
-              <a:rPr lang="es-ES_tradnl" sz="900" dirty="0"/>
+              <a:rPr lang="es-ES_tradnl" sz="1000" dirty="0">
+                <a:latin typeface="Arial" panose="020B0604020202020204" pitchFamily="34" charset="0"/>
+                <a:cs typeface="Arial" panose="020B0604020202020204" pitchFamily="34" charset="0"/>
+              </a:rPr>
               <a:t>+ 3)</a:t>
             </a:r>
-            <a:endParaRPr lang="es-CO" sz="900" dirty="0"/>
+            <a:endParaRPr lang="es-CO" sz="1000" dirty="0">
+              <a:latin typeface="Arial" panose="020B0604020202020204" pitchFamily="34" charset="0"/>
+              <a:cs typeface="Arial" panose="020B0604020202020204" pitchFamily="34" charset="0"/>
+            </a:endParaRPr>
           </a:p>
         </p:txBody>
       </p:sp>
@@ -4189,8 +4644,8 @@
         </p:nvSpPr>
         <p:spPr>
           <a:xfrm>
-            <a:off x="6726906" y="5510188"/>
-            <a:ext cx="1117174" cy="230832"/>
+            <a:off x="6681650" y="5929545"/>
+            <a:ext cx="1117174" cy="215444"/>
           </a:xfrm>
           <a:prstGeom prst="rect">
             <a:avLst/>
@@ -4205,10 +4660,16 @@
           <a:p>
             <a:pPr algn="ctr"/>
             <a:r>
-              <a:rPr lang="es-ES" sz="900" dirty="0" smtClean="0"/>
+              <a:rPr lang="es-ES" sz="800" dirty="0" smtClean="0">
+                <a:latin typeface="Arial" panose="020B0604020202020204" pitchFamily="34" charset="0"/>
+                <a:cs typeface="Arial" panose="020B0604020202020204" pitchFamily="34" charset="0"/>
+              </a:rPr>
               <a:t>ejemplo</a:t>
             </a:r>
-            <a:endParaRPr lang="es-ES" sz="900" dirty="0"/>
+            <a:endParaRPr lang="es-ES" sz="800" dirty="0">
+              <a:latin typeface="Arial" panose="020B0604020202020204" pitchFamily="34" charset="0"/>
+              <a:cs typeface="Arial" panose="020B0604020202020204" pitchFamily="34" charset="0"/>
+            </a:endParaRPr>
           </a:p>
         </p:txBody>
       </p:sp>
@@ -4223,7 +4684,7 @@
         </p:nvCxnSpPr>
         <p:spPr>
           <a:xfrm rot="16200000" flipH="1">
-            <a:off x="7178598" y="5403292"/>
+            <a:off x="7133342" y="5822649"/>
             <a:ext cx="212131" cy="1659"/>
           </a:xfrm>
           <a:prstGeom prst="bentConnector3">
@@ -4263,8 +4724,8 @@
         </p:nvCxnSpPr>
         <p:spPr>
           <a:xfrm rot="16200000" flipH="1">
-            <a:off x="7242556" y="5783956"/>
-            <a:ext cx="94988" cy="9115"/>
+            <a:off x="7189606" y="6195619"/>
+            <a:ext cx="110376" cy="9115"/>
           </a:xfrm>
           <a:prstGeom prst="bentConnector3">
             <a:avLst>
@@ -4300,7 +4761,7 @@
         </p:nvSpPr>
         <p:spPr>
           <a:xfrm>
-            <a:off x="5331133" y="5813234"/>
+            <a:off x="5285877" y="6232591"/>
             <a:ext cx="1122431" cy="353519"/>
           </a:xfrm>
           <a:prstGeom prst="rect">
@@ -4334,97 +4795,165 @@
           <a:lstStyle/>
           <a:p>
             <a:r>
-              <a:rPr lang="es-ES_tradnl" sz="900" i="1" dirty="0"/>
+              <a:rPr lang="es-ES_tradnl" sz="1000" i="1" dirty="0">
+                <a:latin typeface="Arial" panose="020B0604020202020204" pitchFamily="34" charset="0"/>
+                <a:cs typeface="Arial" panose="020B0604020202020204" pitchFamily="34" charset="0"/>
+              </a:rPr>
               <a:t>x</a:t>
             </a:r>
             <a:r>
-              <a:rPr lang="es-ES_tradnl" sz="900" i="1" baseline="30000" dirty="0"/>
+              <a:rPr lang="es-ES_tradnl" sz="1000" i="1" baseline="30000" dirty="0">
+                <a:latin typeface="Arial" panose="020B0604020202020204" pitchFamily="34" charset="0"/>
+                <a:cs typeface="Arial" panose="020B0604020202020204" pitchFamily="34" charset="0"/>
+              </a:rPr>
               <a:t>4</a:t>
             </a:r>
             <a:r>
-              <a:rPr lang="es-ES_tradnl" sz="900" i="1" dirty="0"/>
+              <a:rPr lang="es-ES_tradnl" sz="1000" i="1" dirty="0">
+                <a:latin typeface="Arial" panose="020B0604020202020204" pitchFamily="34" charset="0"/>
+                <a:cs typeface="Arial" panose="020B0604020202020204" pitchFamily="34" charset="0"/>
+              </a:rPr>
               <a:t> + </a:t>
             </a:r>
             <a:r>
-              <a:rPr lang="es-ES_tradnl" sz="900" dirty="0"/>
+              <a:rPr lang="es-ES_tradnl" sz="1000" dirty="0">
+                <a:latin typeface="Arial" panose="020B0604020202020204" pitchFamily="34" charset="0"/>
+                <a:cs typeface="Arial" panose="020B0604020202020204" pitchFamily="34" charset="0"/>
+              </a:rPr>
               <a:t>16</a:t>
             </a:r>
             <a:r>
-              <a:rPr lang="es-ES_tradnl" sz="900" i="1" dirty="0"/>
+              <a:rPr lang="es-ES_tradnl" sz="1000" i="1" dirty="0">
+                <a:latin typeface="Arial" panose="020B0604020202020204" pitchFamily="34" charset="0"/>
+                <a:cs typeface="Arial" panose="020B0604020202020204" pitchFamily="34" charset="0"/>
+              </a:rPr>
               <a:t>x + </a:t>
             </a:r>
             <a:r>
-              <a:rPr lang="es-ES_tradnl" sz="900" dirty="0"/>
+              <a:rPr lang="es-ES_tradnl" sz="1000" dirty="0">
+                <a:latin typeface="Arial" panose="020B0604020202020204" pitchFamily="34" charset="0"/>
+                <a:cs typeface="Arial" panose="020B0604020202020204" pitchFamily="34" charset="0"/>
+              </a:rPr>
               <a:t>60 = </a:t>
             </a:r>
-            <a:endParaRPr lang="es-ES_tradnl" sz="900" dirty="0"/>
           </a:p>
           <a:p>
             <a:r>
-              <a:rPr lang="es-ES_tradnl" sz="900" dirty="0" smtClean="0"/>
+              <a:rPr lang="es-ES_tradnl" sz="1000" dirty="0" smtClean="0">
+                <a:latin typeface="Arial" panose="020B0604020202020204" pitchFamily="34" charset="0"/>
+                <a:cs typeface="Arial" panose="020B0604020202020204" pitchFamily="34" charset="0"/>
+              </a:rPr>
               <a:t>(</a:t>
             </a:r>
             <a:r>
-              <a:rPr lang="es-ES_tradnl" sz="900" i="1" dirty="0"/>
+              <a:rPr lang="es-ES_tradnl" sz="1000" i="1" dirty="0">
+                <a:latin typeface="Arial" panose="020B0604020202020204" pitchFamily="34" charset="0"/>
+                <a:cs typeface="Arial" panose="020B0604020202020204" pitchFamily="34" charset="0"/>
+              </a:rPr>
               <a:t>x</a:t>
             </a:r>
             <a:r>
-              <a:rPr lang="es-ES_tradnl" sz="900" i="1" baseline="30000" dirty="0"/>
+              <a:rPr lang="es-ES_tradnl" sz="1000" i="1" baseline="30000" dirty="0">
+                <a:latin typeface="Arial" panose="020B0604020202020204" pitchFamily="34" charset="0"/>
+                <a:cs typeface="Arial" panose="020B0604020202020204" pitchFamily="34" charset="0"/>
+              </a:rPr>
               <a:t>2</a:t>
             </a:r>
             <a:r>
-              <a:rPr lang="es-ES_tradnl" sz="900" i="1" dirty="0"/>
+              <a:rPr lang="es-ES_tradnl" sz="1000" i="1" dirty="0">
+                <a:latin typeface="Arial" panose="020B0604020202020204" pitchFamily="34" charset="0"/>
+                <a:cs typeface="Arial" panose="020B0604020202020204" pitchFamily="34" charset="0"/>
+              </a:rPr>
               <a:t> </a:t>
             </a:r>
             <a:r>
-              <a:rPr lang="es-ES_tradnl" sz="900" dirty="0"/>
+              <a:rPr lang="es-ES_tradnl" sz="1000" dirty="0">
+                <a:latin typeface="Arial" panose="020B0604020202020204" pitchFamily="34" charset="0"/>
+                <a:cs typeface="Arial" panose="020B0604020202020204" pitchFamily="34" charset="0"/>
+              </a:rPr>
               <a:t>+</a:t>
             </a:r>
             <a:r>
-              <a:rPr lang="es-ES_tradnl" sz="900" i="1" dirty="0"/>
+              <a:rPr lang="es-ES_tradnl" sz="1000" i="1" dirty="0">
+                <a:latin typeface="Arial" panose="020B0604020202020204" pitchFamily="34" charset="0"/>
+                <a:cs typeface="Arial" panose="020B0604020202020204" pitchFamily="34" charset="0"/>
+              </a:rPr>
               <a:t> </a:t>
             </a:r>
             <a:r>
-              <a:rPr lang="es-ES_tradnl" sz="900" dirty="0"/>
+              <a:rPr lang="es-ES_tradnl" sz="1000" dirty="0">
+                <a:latin typeface="Arial" panose="020B0604020202020204" pitchFamily="34" charset="0"/>
+                <a:cs typeface="Arial" panose="020B0604020202020204" pitchFamily="34" charset="0"/>
+              </a:rPr>
               <a:t>6</a:t>
             </a:r>
             <a:r>
-              <a:rPr lang="es-ES_tradnl" sz="900" i="1" dirty="0"/>
+              <a:rPr lang="es-ES_tradnl" sz="1000" i="1" dirty="0">
+                <a:latin typeface="Arial" panose="020B0604020202020204" pitchFamily="34" charset="0"/>
+                <a:cs typeface="Arial" panose="020B0604020202020204" pitchFamily="34" charset="0"/>
+              </a:rPr>
               <a:t> </a:t>
             </a:r>
             <a:r>
-              <a:rPr lang="es-ES_tradnl" sz="900" dirty="0"/>
+              <a:rPr lang="es-ES_tradnl" sz="1000" dirty="0">
+                <a:latin typeface="Arial" panose="020B0604020202020204" pitchFamily="34" charset="0"/>
+                <a:cs typeface="Arial" panose="020B0604020202020204" pitchFamily="34" charset="0"/>
+              </a:rPr>
               <a:t>) (</a:t>
             </a:r>
             <a:r>
-              <a:rPr lang="es-ES_tradnl" sz="900" i="1" dirty="0"/>
+              <a:rPr lang="es-ES_tradnl" sz="1000" i="1" dirty="0">
+                <a:latin typeface="Arial" panose="020B0604020202020204" pitchFamily="34" charset="0"/>
+                <a:cs typeface="Arial" panose="020B0604020202020204" pitchFamily="34" charset="0"/>
+              </a:rPr>
               <a:t>x</a:t>
             </a:r>
             <a:r>
-              <a:rPr lang="es-ES_tradnl" sz="900" i="1" baseline="30000" dirty="0"/>
+              <a:rPr lang="es-ES_tradnl" sz="1000" i="1" baseline="30000" dirty="0">
+                <a:latin typeface="Arial" panose="020B0604020202020204" pitchFamily="34" charset="0"/>
+                <a:cs typeface="Arial" panose="020B0604020202020204" pitchFamily="34" charset="0"/>
+              </a:rPr>
               <a:t>2</a:t>
             </a:r>
             <a:r>
-              <a:rPr lang="es-ES_tradnl" sz="900" dirty="0"/>
+              <a:rPr lang="es-ES_tradnl" sz="1000" dirty="0">
+                <a:latin typeface="Arial" panose="020B0604020202020204" pitchFamily="34" charset="0"/>
+                <a:cs typeface="Arial" panose="020B0604020202020204" pitchFamily="34" charset="0"/>
+              </a:rPr>
               <a:t> +</a:t>
             </a:r>
             <a:r>
-              <a:rPr lang="es-ES_tradnl" sz="900" i="1" dirty="0"/>
+              <a:rPr lang="es-ES_tradnl" sz="1000" i="1" dirty="0">
+                <a:latin typeface="Arial" panose="020B0604020202020204" pitchFamily="34" charset="0"/>
+                <a:cs typeface="Arial" panose="020B0604020202020204" pitchFamily="34" charset="0"/>
+              </a:rPr>
               <a:t> </a:t>
             </a:r>
             <a:r>
-              <a:rPr lang="es-ES_tradnl" sz="900" dirty="0"/>
+              <a:rPr lang="es-ES_tradnl" sz="1000" dirty="0">
+                <a:latin typeface="Arial" panose="020B0604020202020204" pitchFamily="34" charset="0"/>
+                <a:cs typeface="Arial" panose="020B0604020202020204" pitchFamily="34" charset="0"/>
+              </a:rPr>
               <a:t>10</a:t>
             </a:r>
             <a:r>
-              <a:rPr lang="es-ES_tradnl" sz="900" i="1" dirty="0"/>
+              <a:rPr lang="es-ES_tradnl" sz="1000" i="1" dirty="0">
+                <a:latin typeface="Arial" panose="020B0604020202020204" pitchFamily="34" charset="0"/>
+                <a:cs typeface="Arial" panose="020B0604020202020204" pitchFamily="34" charset="0"/>
+              </a:rPr>
               <a:t> </a:t>
             </a:r>
             <a:r>
-              <a:rPr lang="es-ES_tradnl" sz="900" dirty="0"/>
+              <a:rPr lang="es-ES_tradnl" sz="1000" dirty="0">
+                <a:latin typeface="Arial" panose="020B0604020202020204" pitchFamily="34" charset="0"/>
+                <a:cs typeface="Arial" panose="020B0604020202020204" pitchFamily="34" charset="0"/>
+              </a:rPr>
               <a:t>)</a:t>
             </a:r>
-            <a:endParaRPr lang="es-CO" sz="900" dirty="0"/>
+            <a:endParaRPr lang="es-CO" sz="1000" dirty="0">
+              <a:latin typeface="Arial" panose="020B0604020202020204" pitchFamily="34" charset="0"/>
+              <a:cs typeface="Arial" panose="020B0604020202020204" pitchFamily="34" charset="0"/>
+            </a:endParaRPr>
           </a:p>
         </p:txBody>
       </p:sp>
@@ -4436,8 +4965,8 @@
         </p:nvSpPr>
         <p:spPr>
           <a:xfrm>
-            <a:off x="5332883" y="5487417"/>
-            <a:ext cx="1117174" cy="230832"/>
+            <a:off x="5287627" y="5906774"/>
+            <a:ext cx="1117174" cy="215444"/>
           </a:xfrm>
           <a:prstGeom prst="rect">
             <a:avLst/>
@@ -4452,10 +4981,16 @@
           <a:p>
             <a:pPr algn="ctr"/>
             <a:r>
-              <a:rPr lang="es-ES" sz="900" dirty="0" smtClean="0"/>
+              <a:rPr lang="es-ES" sz="800" dirty="0" smtClean="0">
+                <a:latin typeface="Arial" panose="020B0604020202020204" pitchFamily="34" charset="0"/>
+                <a:cs typeface="Arial" panose="020B0604020202020204" pitchFamily="34" charset="0"/>
+              </a:rPr>
               <a:t>ejemplo</a:t>
             </a:r>
-            <a:endParaRPr lang="es-ES" sz="900" dirty="0"/>
+            <a:endParaRPr lang="es-ES" sz="800" dirty="0">
+              <a:latin typeface="Arial" panose="020B0604020202020204" pitchFamily="34" charset="0"/>
+              <a:cs typeface="Arial" panose="020B0604020202020204" pitchFamily="34" charset="0"/>
+            </a:endParaRPr>
           </a:p>
         </p:txBody>
       </p:sp>
@@ -4470,7 +5005,7 @@
         </p:nvCxnSpPr>
         <p:spPr>
           <a:xfrm rot="16200000" flipH="1">
-            <a:off x="5734879" y="5330826"/>
+            <a:off x="5689623" y="5750183"/>
             <a:ext cx="308948" cy="4234"/>
           </a:xfrm>
           <a:prstGeom prst="bentConnector3">
@@ -4510,8 +5045,8 @@
         </p:nvCxnSpPr>
         <p:spPr>
           <a:xfrm rot="16200000" flipH="1">
-            <a:off x="5844417" y="5765301"/>
-            <a:ext cx="94985" cy="879"/>
+            <a:off x="5791467" y="6176964"/>
+            <a:ext cx="110373" cy="879"/>
           </a:xfrm>
           <a:prstGeom prst="bentConnector3">
             <a:avLst>
@@ -4547,7 +5082,7 @@
         </p:nvSpPr>
         <p:spPr>
           <a:xfrm>
-            <a:off x="3831685" y="6354481"/>
+            <a:off x="3786429" y="6773838"/>
             <a:ext cx="1668456" cy="353519"/>
           </a:xfrm>
           <a:prstGeom prst="rect">
@@ -4582,149 +5117,256 @@
           <a:p>
             <a:pPr algn="ctr"/>
             <a:r>
-              <a:rPr lang="es-ES_tradnl" sz="900" dirty="0"/>
+              <a:rPr lang="es-ES_tradnl" sz="1000" dirty="0">
+                <a:latin typeface="Arial" panose="020B0604020202020204" pitchFamily="34" charset="0"/>
+                <a:cs typeface="Arial" panose="020B0604020202020204" pitchFamily="34" charset="0"/>
+              </a:rPr>
               <a:t>4</a:t>
             </a:r>
             <a:r>
-              <a:rPr lang="es-ES_tradnl" sz="900" i="1" dirty="0"/>
+              <a:rPr lang="es-ES_tradnl" sz="1000" i="1" dirty="0">
+                <a:latin typeface="Arial" panose="020B0604020202020204" pitchFamily="34" charset="0"/>
+                <a:cs typeface="Arial" panose="020B0604020202020204" pitchFamily="34" charset="0"/>
+              </a:rPr>
               <a:t>x</a:t>
             </a:r>
             <a:r>
-              <a:rPr lang="es-ES_tradnl" sz="900" i="1" baseline="30000" dirty="0"/>
+              <a:rPr lang="es-ES_tradnl" sz="1000" i="1" baseline="30000" dirty="0">
+                <a:latin typeface="Arial" panose="020B0604020202020204" pitchFamily="34" charset="0"/>
+                <a:cs typeface="Arial" panose="020B0604020202020204" pitchFamily="34" charset="0"/>
+              </a:rPr>
               <a:t>4</a:t>
             </a:r>
             <a:r>
-              <a:rPr lang="es-ES_tradnl" sz="900" i="1" dirty="0"/>
+              <a:rPr lang="es-ES_tradnl" sz="1000" i="1" dirty="0">
+                <a:latin typeface="Arial" panose="020B0604020202020204" pitchFamily="34" charset="0"/>
+                <a:cs typeface="Arial" panose="020B0604020202020204" pitchFamily="34" charset="0"/>
+              </a:rPr>
               <a:t> + </a:t>
             </a:r>
             <a:r>
-              <a:rPr lang="es-ES_tradnl" sz="900" dirty="0"/>
+              <a:rPr lang="es-ES_tradnl" sz="1000" dirty="0">
+                <a:latin typeface="Arial" panose="020B0604020202020204" pitchFamily="34" charset="0"/>
+                <a:cs typeface="Arial" panose="020B0604020202020204" pitchFamily="34" charset="0"/>
+              </a:rPr>
               <a:t>8</a:t>
             </a:r>
             <a:r>
-              <a:rPr lang="es-ES_tradnl" sz="900" i="1" dirty="0"/>
+              <a:rPr lang="es-ES_tradnl" sz="1000" i="1" dirty="0">
+                <a:latin typeface="Arial" panose="020B0604020202020204" pitchFamily="34" charset="0"/>
+                <a:cs typeface="Arial" panose="020B0604020202020204" pitchFamily="34" charset="0"/>
+              </a:rPr>
               <a:t>x</a:t>
             </a:r>
             <a:r>
-              <a:rPr lang="es-ES_tradnl" sz="900" i="1" baseline="30000" dirty="0"/>
+              <a:rPr lang="es-ES_tradnl" sz="1000" i="1" baseline="30000" dirty="0">
+                <a:latin typeface="Arial" panose="020B0604020202020204" pitchFamily="34" charset="0"/>
+                <a:cs typeface="Arial" panose="020B0604020202020204" pitchFamily="34" charset="0"/>
+              </a:rPr>
               <a:t>2</a:t>
             </a:r>
             <a:r>
-              <a:rPr lang="es-ES_tradnl" sz="900" i="1" dirty="0"/>
+              <a:rPr lang="es-ES_tradnl" sz="1000" i="1" dirty="0">
+                <a:latin typeface="Arial" panose="020B0604020202020204" pitchFamily="34" charset="0"/>
+                <a:cs typeface="Arial" panose="020B0604020202020204" pitchFamily="34" charset="0"/>
+              </a:rPr>
               <a:t>y</a:t>
             </a:r>
             <a:r>
-              <a:rPr lang="es-ES_tradnl" sz="900" i="1" baseline="30000" dirty="0"/>
+              <a:rPr lang="es-ES_tradnl" sz="1000" i="1" baseline="30000" dirty="0">
+                <a:latin typeface="Arial" panose="020B0604020202020204" pitchFamily="34" charset="0"/>
+                <a:cs typeface="Arial" panose="020B0604020202020204" pitchFamily="34" charset="0"/>
+              </a:rPr>
               <a:t>2</a:t>
             </a:r>
             <a:r>
-              <a:rPr lang="es-ES_tradnl" sz="900" i="1" dirty="0"/>
+              <a:rPr lang="es-ES_tradnl" sz="1000" i="1" dirty="0">
+                <a:latin typeface="Arial" panose="020B0604020202020204" pitchFamily="34" charset="0"/>
+                <a:cs typeface="Arial" panose="020B0604020202020204" pitchFamily="34" charset="0"/>
+              </a:rPr>
               <a:t> + </a:t>
             </a:r>
             <a:r>
-              <a:rPr lang="es-ES_tradnl" sz="900" dirty="0"/>
+              <a:rPr lang="es-ES_tradnl" sz="1000" dirty="0">
+                <a:latin typeface="Arial" panose="020B0604020202020204" pitchFamily="34" charset="0"/>
+                <a:cs typeface="Arial" panose="020B0604020202020204" pitchFamily="34" charset="0"/>
+              </a:rPr>
               <a:t>9</a:t>
             </a:r>
             <a:r>
-              <a:rPr lang="es-ES_tradnl" sz="900" i="1" dirty="0"/>
+              <a:rPr lang="es-ES_tradnl" sz="1000" i="1" dirty="0">
+                <a:latin typeface="Arial" panose="020B0604020202020204" pitchFamily="34" charset="0"/>
+                <a:cs typeface="Arial" panose="020B0604020202020204" pitchFamily="34" charset="0"/>
+              </a:rPr>
               <a:t>y</a:t>
             </a:r>
             <a:r>
-              <a:rPr lang="es-ES_tradnl" sz="900" i="1" baseline="30000" dirty="0"/>
+              <a:rPr lang="es-ES_tradnl" sz="1000" i="1" baseline="30000" dirty="0">
+                <a:latin typeface="Arial" panose="020B0604020202020204" pitchFamily="34" charset="0"/>
+                <a:cs typeface="Arial" panose="020B0604020202020204" pitchFamily="34" charset="0"/>
+              </a:rPr>
               <a:t>4</a:t>
             </a:r>
             <a:r>
-              <a:rPr lang="es-ES_tradnl" sz="900" i="1" dirty="0"/>
+              <a:rPr lang="es-ES_tradnl" sz="1000" i="1" dirty="0">
+                <a:latin typeface="Arial" panose="020B0604020202020204" pitchFamily="34" charset="0"/>
+                <a:cs typeface="Arial" panose="020B0604020202020204" pitchFamily="34" charset="0"/>
+              </a:rPr>
               <a:t> = </a:t>
             </a:r>
-            <a:endParaRPr lang="es-ES_tradnl" sz="900" i="1" dirty="0" smtClean="0"/>
+            <a:endParaRPr lang="es-ES_tradnl" sz="1000" i="1" dirty="0" smtClean="0">
+              <a:latin typeface="Arial" panose="020B0604020202020204" pitchFamily="34" charset="0"/>
+              <a:cs typeface="Arial" panose="020B0604020202020204" pitchFamily="34" charset="0"/>
+            </a:endParaRPr>
           </a:p>
           <a:p>
             <a:pPr algn="ctr"/>
             <a:r>
-              <a:rPr lang="es-ES_tradnl" sz="900" dirty="0"/>
+              <a:rPr lang="es-ES_tradnl" sz="1000" dirty="0">
+                <a:latin typeface="Arial" panose="020B0604020202020204" pitchFamily="34" charset="0"/>
+                <a:cs typeface="Arial" panose="020B0604020202020204" pitchFamily="34" charset="0"/>
+              </a:rPr>
               <a:t>(2</a:t>
             </a:r>
             <a:r>
-              <a:rPr lang="es-ES_tradnl" sz="900" i="1" dirty="0"/>
+              <a:rPr lang="es-ES_tradnl" sz="1000" i="1" dirty="0">
+                <a:latin typeface="Arial" panose="020B0604020202020204" pitchFamily="34" charset="0"/>
+                <a:cs typeface="Arial" panose="020B0604020202020204" pitchFamily="34" charset="0"/>
+              </a:rPr>
               <a:t>x</a:t>
             </a:r>
             <a:r>
-              <a:rPr lang="es-ES_tradnl" sz="900" i="1" baseline="30000" dirty="0"/>
+              <a:rPr lang="es-ES_tradnl" sz="1000" i="1" baseline="30000" dirty="0">
+                <a:latin typeface="Arial" panose="020B0604020202020204" pitchFamily="34" charset="0"/>
+                <a:cs typeface="Arial" panose="020B0604020202020204" pitchFamily="34" charset="0"/>
+              </a:rPr>
               <a:t>2</a:t>
             </a:r>
             <a:r>
-              <a:rPr lang="es-ES_tradnl" sz="900" i="1" dirty="0"/>
+              <a:rPr lang="es-ES_tradnl" sz="1000" i="1" dirty="0">
+                <a:latin typeface="Arial" panose="020B0604020202020204" pitchFamily="34" charset="0"/>
+                <a:cs typeface="Arial" panose="020B0604020202020204" pitchFamily="34" charset="0"/>
+              </a:rPr>
               <a:t>– </a:t>
             </a:r>
             <a:r>
-              <a:rPr lang="es-ES_tradnl" sz="900" dirty="0"/>
+              <a:rPr lang="es-ES_tradnl" sz="1000" dirty="0">
+                <a:latin typeface="Arial" panose="020B0604020202020204" pitchFamily="34" charset="0"/>
+                <a:cs typeface="Arial" panose="020B0604020202020204" pitchFamily="34" charset="0"/>
+              </a:rPr>
               <a:t>2</a:t>
             </a:r>
             <a:r>
-              <a:rPr lang="es-ES_tradnl" sz="900" i="1" dirty="0"/>
+              <a:rPr lang="es-ES_tradnl" sz="1000" i="1" dirty="0">
+                <a:latin typeface="Arial" panose="020B0604020202020204" pitchFamily="34" charset="0"/>
+                <a:cs typeface="Arial" panose="020B0604020202020204" pitchFamily="34" charset="0"/>
+              </a:rPr>
               <a:t>xy </a:t>
             </a:r>
             <a:r>
-              <a:rPr lang="es-ES_tradnl" sz="900" dirty="0"/>
+              <a:rPr lang="es-ES_tradnl" sz="1000" dirty="0">
+                <a:latin typeface="Arial" panose="020B0604020202020204" pitchFamily="34" charset="0"/>
+                <a:cs typeface="Arial" panose="020B0604020202020204" pitchFamily="34" charset="0"/>
+              </a:rPr>
               <a:t>+ 3</a:t>
             </a:r>
             <a:r>
-              <a:rPr lang="es-ES_tradnl" sz="900" i="1" dirty="0"/>
+              <a:rPr lang="es-ES_tradnl" sz="1000" i="1" dirty="0">
+                <a:latin typeface="Arial" panose="020B0604020202020204" pitchFamily="34" charset="0"/>
+                <a:cs typeface="Arial" panose="020B0604020202020204" pitchFamily="34" charset="0"/>
+              </a:rPr>
               <a:t>y</a:t>
             </a:r>
             <a:r>
-              <a:rPr lang="es-ES_tradnl" sz="900" i="1" baseline="30000" dirty="0"/>
+              <a:rPr lang="es-ES_tradnl" sz="1000" i="1" baseline="30000" dirty="0">
+                <a:latin typeface="Arial" panose="020B0604020202020204" pitchFamily="34" charset="0"/>
+                <a:cs typeface="Arial" panose="020B0604020202020204" pitchFamily="34" charset="0"/>
+              </a:rPr>
               <a:t>2</a:t>
             </a:r>
             <a:r>
-              <a:rPr lang="es-ES_tradnl" sz="900" dirty="0"/>
+              <a:rPr lang="es-ES_tradnl" sz="1000" dirty="0">
+                <a:latin typeface="Arial" panose="020B0604020202020204" pitchFamily="34" charset="0"/>
+                <a:cs typeface="Arial" panose="020B0604020202020204" pitchFamily="34" charset="0"/>
+              </a:rPr>
               <a:t>) (2</a:t>
             </a:r>
             <a:r>
-              <a:rPr lang="es-ES_tradnl" sz="900" i="1" dirty="0"/>
+              <a:rPr lang="es-ES_tradnl" sz="1000" i="1" dirty="0">
+                <a:latin typeface="Arial" panose="020B0604020202020204" pitchFamily="34" charset="0"/>
+                <a:cs typeface="Arial" panose="020B0604020202020204" pitchFamily="34" charset="0"/>
+              </a:rPr>
               <a:t>x</a:t>
             </a:r>
             <a:r>
-              <a:rPr lang="es-ES_tradnl" sz="900" i="1" baseline="30000" dirty="0"/>
+              <a:rPr lang="es-ES_tradnl" sz="1000" i="1" baseline="30000" dirty="0">
+                <a:latin typeface="Arial" panose="020B0604020202020204" pitchFamily="34" charset="0"/>
+                <a:cs typeface="Arial" panose="020B0604020202020204" pitchFamily="34" charset="0"/>
+              </a:rPr>
               <a:t>2</a:t>
             </a:r>
             <a:r>
-              <a:rPr lang="es-ES_tradnl" sz="900" dirty="0"/>
+              <a:rPr lang="es-ES_tradnl" sz="1000" dirty="0">
+                <a:latin typeface="Arial" panose="020B0604020202020204" pitchFamily="34" charset="0"/>
+                <a:cs typeface="Arial" panose="020B0604020202020204" pitchFamily="34" charset="0"/>
+              </a:rPr>
               <a:t> </a:t>
             </a:r>
             <a:r>
-              <a:rPr lang="es-ES_tradnl" sz="900" i="1" dirty="0"/>
+              <a:rPr lang="es-ES_tradnl" sz="1000" i="1" dirty="0">
+                <a:latin typeface="Arial" panose="020B0604020202020204" pitchFamily="34" charset="0"/>
+                <a:cs typeface="Arial" panose="020B0604020202020204" pitchFamily="34" charset="0"/>
+              </a:rPr>
               <a:t>+ </a:t>
             </a:r>
             <a:r>
-              <a:rPr lang="es-ES_tradnl" sz="900" dirty="0"/>
+              <a:rPr lang="es-ES_tradnl" sz="1000" dirty="0">
+                <a:latin typeface="Arial" panose="020B0604020202020204" pitchFamily="34" charset="0"/>
+                <a:cs typeface="Arial" panose="020B0604020202020204" pitchFamily="34" charset="0"/>
+              </a:rPr>
               <a:t>2</a:t>
             </a:r>
             <a:r>
-              <a:rPr lang="es-ES_tradnl" sz="900" i="1" dirty="0"/>
+              <a:rPr lang="es-ES_tradnl" sz="1000" i="1" dirty="0">
+                <a:latin typeface="Arial" panose="020B0604020202020204" pitchFamily="34" charset="0"/>
+                <a:cs typeface="Arial" panose="020B0604020202020204" pitchFamily="34" charset="0"/>
+              </a:rPr>
               <a:t>xy </a:t>
             </a:r>
             <a:r>
-              <a:rPr lang="es-ES_tradnl" sz="900" dirty="0"/>
+              <a:rPr lang="es-ES_tradnl" sz="1000" dirty="0">
+                <a:latin typeface="Arial" panose="020B0604020202020204" pitchFamily="34" charset="0"/>
+                <a:cs typeface="Arial" panose="020B0604020202020204" pitchFamily="34" charset="0"/>
+              </a:rPr>
               <a:t>+ 3</a:t>
             </a:r>
             <a:r>
-              <a:rPr lang="es-ES_tradnl" sz="900" i="1" dirty="0"/>
+              <a:rPr lang="es-ES_tradnl" sz="1000" i="1" dirty="0">
+                <a:latin typeface="Arial" panose="020B0604020202020204" pitchFamily="34" charset="0"/>
+                <a:cs typeface="Arial" panose="020B0604020202020204" pitchFamily="34" charset="0"/>
+              </a:rPr>
               <a:t>y</a:t>
             </a:r>
             <a:r>
-              <a:rPr lang="es-ES_tradnl" sz="900" i="1" baseline="30000" dirty="0"/>
+              <a:rPr lang="es-ES_tradnl" sz="1000" i="1" baseline="30000" dirty="0">
+                <a:latin typeface="Arial" panose="020B0604020202020204" pitchFamily="34" charset="0"/>
+                <a:cs typeface="Arial" panose="020B0604020202020204" pitchFamily="34" charset="0"/>
+              </a:rPr>
               <a:t>2</a:t>
             </a:r>
             <a:r>
-              <a:rPr lang="es-ES_tradnl" sz="900" dirty="0" smtClean="0"/>
+              <a:rPr lang="es-ES_tradnl" sz="1000" dirty="0" smtClean="0">
+                <a:latin typeface="Arial" panose="020B0604020202020204" pitchFamily="34" charset="0"/>
+                <a:cs typeface="Arial" panose="020B0604020202020204" pitchFamily="34" charset="0"/>
+              </a:rPr>
               <a:t>)</a:t>
             </a:r>
-            <a:endParaRPr lang="es-ES" sz="900" dirty="0">
+            <a:endParaRPr lang="es-ES" sz="1000" dirty="0">
               <a:solidFill>
                 <a:schemeClr val="tx1"/>
               </a:solidFill>
+              <a:latin typeface="Arial" panose="020B0604020202020204" pitchFamily="34" charset="0"/>
+              <a:cs typeface="Arial" panose="020B0604020202020204" pitchFamily="34" charset="0"/>
             </a:endParaRPr>
           </a:p>
         </p:txBody>
@@ -4737,8 +5379,8 @@
         </p:nvSpPr>
         <p:spPr>
           <a:xfrm>
-            <a:off x="4105209" y="5530926"/>
-            <a:ext cx="1117174" cy="230832"/>
+            <a:off x="4059953" y="5950283"/>
+            <a:ext cx="1117174" cy="215444"/>
           </a:xfrm>
           <a:prstGeom prst="rect">
             <a:avLst/>
@@ -4753,10 +5395,16 @@
           <a:p>
             <a:pPr algn="ctr"/>
             <a:r>
-              <a:rPr lang="es-ES" sz="900" dirty="0" smtClean="0"/>
+              <a:rPr lang="es-ES" sz="800" dirty="0" smtClean="0">
+                <a:latin typeface="Arial" panose="020B0604020202020204" pitchFamily="34" charset="0"/>
+                <a:cs typeface="Arial" panose="020B0604020202020204" pitchFamily="34" charset="0"/>
+              </a:rPr>
               <a:t>ejemplo</a:t>
             </a:r>
-            <a:endParaRPr lang="es-ES" sz="900" dirty="0"/>
+            <a:endParaRPr lang="es-ES" sz="800" dirty="0">
+              <a:latin typeface="Arial" panose="020B0604020202020204" pitchFamily="34" charset="0"/>
+              <a:cs typeface="Arial" panose="020B0604020202020204" pitchFamily="34" charset="0"/>
+            </a:endParaRPr>
           </a:p>
         </p:txBody>
       </p:sp>
@@ -4771,7 +5419,7 @@
         </p:nvCxnSpPr>
         <p:spPr>
           <a:xfrm rot="5400000">
-            <a:off x="4524279" y="5388229"/>
+            <a:off x="4479023" y="5807586"/>
             <a:ext cx="282214" cy="3180"/>
           </a:xfrm>
           <a:prstGeom prst="bentConnector3">
@@ -4811,8 +5459,8 @@
         </p:nvCxnSpPr>
         <p:spPr>
           <a:xfrm rot="16200000" flipH="1">
-            <a:off x="4368493" y="6057060"/>
-            <a:ext cx="592723" cy="2117"/>
+            <a:off x="4315543" y="6468723"/>
+            <a:ext cx="608111" cy="2117"/>
           </a:xfrm>
           <a:prstGeom prst="bentConnector3">
             <a:avLst>
@@ -4851,7 +5499,7 @@
         </p:nvCxnSpPr>
         <p:spPr>
           <a:xfrm rot="16200000" flipH="1">
-            <a:off x="2824116" y="2991629"/>
+            <a:off x="2778860" y="3410986"/>
             <a:ext cx="81457" cy="707"/>
           </a:xfrm>
           <a:prstGeom prst="bentConnector3">
@@ -4891,7 +5539,7 @@
         </p:nvCxnSpPr>
         <p:spPr>
           <a:xfrm rot="16200000" flipH="1">
-            <a:off x="4217957" y="3012386"/>
+            <a:off x="4172701" y="3431743"/>
             <a:ext cx="54285" cy="1777"/>
           </a:xfrm>
           <a:prstGeom prst="bentConnector3">
@@ -4931,7 +5579,7 @@
         </p:nvCxnSpPr>
         <p:spPr>
           <a:xfrm rot="16200000" flipH="1">
-            <a:off x="6822268" y="2976069"/>
+            <a:off x="6777012" y="3395426"/>
             <a:ext cx="75342" cy="4893"/>
           </a:xfrm>
           <a:prstGeom prst="bentConnector3">
@@ -4971,7 +5619,7 @@
         </p:nvCxnSpPr>
         <p:spPr>
           <a:xfrm rot="5400000">
-            <a:off x="8326502" y="2987481"/>
+            <a:off x="8281246" y="3406838"/>
             <a:ext cx="87234" cy="2372"/>
           </a:xfrm>
           <a:prstGeom prst="bentConnector3">
@@ -5011,8 +5659,8 @@
         </p:nvCxnSpPr>
         <p:spPr>
           <a:xfrm rot="5400000">
-            <a:off x="2841854" y="3285572"/>
-            <a:ext cx="45373" cy="1316"/>
+            <a:off x="2788904" y="3697235"/>
+            <a:ext cx="60761" cy="1316"/>
           </a:xfrm>
           <a:prstGeom prst="bentConnector3">
             <a:avLst>
@@ -5051,8 +5699,8 @@
         </p:nvCxnSpPr>
         <p:spPr>
           <a:xfrm rot="5400000">
-            <a:off x="4222037" y="3294059"/>
-            <a:ext cx="46761" cy="1142"/>
+            <a:off x="4169087" y="3705722"/>
+            <a:ext cx="62149" cy="1142"/>
           </a:xfrm>
           <a:prstGeom prst="bentConnector3">
             <a:avLst>
@@ -5091,8 +5739,8 @@
         </p:nvCxnSpPr>
         <p:spPr>
           <a:xfrm rot="5400000">
-            <a:off x="6837228" y="3267283"/>
-            <a:ext cx="45422" cy="4894"/>
+            <a:off x="6784278" y="3678946"/>
+            <a:ext cx="60810" cy="4894"/>
           </a:xfrm>
           <a:prstGeom prst="bentConnector3">
             <a:avLst>
@@ -5131,12 +5779,525 @@
         </p:nvCxnSpPr>
         <p:spPr>
           <a:xfrm rot="16200000" flipH="1">
-            <a:off x="8212412" y="3419637"/>
-            <a:ext cx="450895" cy="137852"/>
+            <a:off x="8174850" y="3846689"/>
+            <a:ext cx="435506" cy="137852"/>
           </a:xfrm>
           <a:prstGeom prst="bentConnector3">
             <a:avLst>
               <a:gd name="adj1" fmla="val 50000"/>
+            </a:avLst>
+          </a:prstGeom>
+          <a:ln w="12700">
+            <a:solidFill>
+              <a:schemeClr val="tx1"/>
+            </a:solidFill>
+          </a:ln>
+        </p:spPr>
+        <p:style>
+          <a:lnRef idx="1">
+            <a:schemeClr val="accent1"/>
+          </a:lnRef>
+          <a:fillRef idx="0">
+            <a:schemeClr val="accent1"/>
+          </a:fillRef>
+          <a:effectRef idx="0">
+            <a:schemeClr val="accent1"/>
+          </a:effectRef>
+          <a:fontRef idx="minor">
+            <a:schemeClr val="tx1"/>
+          </a:fontRef>
+        </p:style>
+      </p:cxnSp>
+      <p:cxnSp>
+        <p:nvCxnSpPr>
+          <p:cNvPr id="87" name="Conector angular 86"/>
+          <p:cNvCxnSpPr/>
+          <p:nvPr/>
+        </p:nvCxnSpPr>
+        <p:spPr>
+          <a:xfrm rot="5400000">
+            <a:off x="4716625" y="768298"/>
+            <a:ext cx="53240" cy="1"/>
+          </a:xfrm>
+          <a:prstGeom prst="bentConnector3">
+            <a:avLst>
+              <a:gd name="adj1" fmla="val 229219"/>
+            </a:avLst>
+          </a:prstGeom>
+          <a:ln w="12700">
+            <a:solidFill>
+              <a:schemeClr val="tx1"/>
+            </a:solidFill>
+          </a:ln>
+        </p:spPr>
+        <p:style>
+          <a:lnRef idx="1">
+            <a:schemeClr val="accent1"/>
+          </a:lnRef>
+          <a:fillRef idx="0">
+            <a:schemeClr val="accent1"/>
+          </a:fillRef>
+          <a:effectRef idx="0">
+            <a:schemeClr val="accent1"/>
+          </a:effectRef>
+          <a:fontRef idx="minor">
+            <a:schemeClr val="tx1"/>
+          </a:fontRef>
+        </p:style>
+      </p:cxnSp>
+      <p:sp>
+        <p:nvSpPr>
+          <p:cNvPr id="119" name="CuadroTexto 118" descr="Conector entre nodos" title="conector"/>
+          <p:cNvSpPr txBox="1"/>
+          <p:nvPr/>
+        </p:nvSpPr>
+        <p:spPr>
+          <a:xfrm>
+            <a:off x="4206383" y="1748163"/>
+            <a:ext cx="1117174" cy="246221"/>
+          </a:xfrm>
+          <a:prstGeom prst="rect">
+            <a:avLst/>
+          </a:prstGeom>
+          <a:noFill/>
+        </p:spPr>
+        <p:txBody>
+          <a:bodyPr wrap="square" rtlCol="0">
+            <a:spAutoFit/>
+          </a:bodyPr>
+          <a:lstStyle/>
+          <a:p>
+            <a:pPr algn="ctr"/>
+            <a:r>
+              <a:rPr lang="es-ES" sz="1000" dirty="0" smtClean="0">
+                <a:latin typeface="Arial" panose="020B0604020202020204" pitchFamily="34" charset="0"/>
+                <a:cs typeface="Arial" panose="020B0604020202020204" pitchFamily="34" charset="0"/>
+              </a:rPr>
+              <a:t>puede realizarse</a:t>
+            </a:r>
+            <a:endParaRPr lang="es-ES" sz="1000" dirty="0">
+              <a:latin typeface="Arial" panose="020B0604020202020204" pitchFamily="34" charset="0"/>
+              <a:cs typeface="Arial" panose="020B0604020202020204" pitchFamily="34" charset="0"/>
+            </a:endParaRPr>
+          </a:p>
+        </p:txBody>
+      </p:sp>
+      <p:sp>
+        <p:nvSpPr>
+          <p:cNvPr id="126" name="Rectángulo 125" descr="Nodo de primer nivel" title="Nodo01"/>
+          <p:cNvSpPr/>
+          <p:nvPr/>
+        </p:nvSpPr>
+        <p:spPr>
+          <a:xfrm>
+            <a:off x="786985" y="2353466"/>
+            <a:ext cx="1080125" cy="390799"/>
+          </a:xfrm>
+          <a:prstGeom prst="rect">
+            <a:avLst/>
+          </a:prstGeom>
+          <a:solidFill>
+            <a:schemeClr val="bg1"/>
+          </a:solidFill>
+          <a:ln>
+            <a:solidFill>
+              <a:schemeClr val="tx1"/>
+            </a:solidFill>
+          </a:ln>
+          <a:effectLst>
+            <a:outerShdw blurRad="50800" dist="38100" dir="2700000" algn="tl" rotWithShape="0">
+              <a:prstClr val="black">
+                <a:alpha val="40000"/>
+              </a:prstClr>
+            </a:outerShdw>
+          </a:effectLst>
+        </p:spPr>
+        <p:style>
+          <a:lnRef idx="2">
+            <a:schemeClr val="accent6"/>
+          </a:lnRef>
+          <a:fillRef idx="1">
+            <a:schemeClr val="lt1"/>
+          </a:fillRef>
+          <a:effectRef idx="0">
+            <a:schemeClr val="accent6"/>
+          </a:effectRef>
+          <a:fontRef idx="minor">
+            <a:schemeClr val="dk1"/>
+          </a:fontRef>
+        </p:style>
+        <p:txBody>
+          <a:bodyPr rtlCol="0" anchor="ctr"/>
+          <a:lstStyle/>
+          <a:p>
+            <a:pPr algn="ctr"/>
+            <a:r>
+              <a:rPr lang="es-ES" sz="1000" b="1" dirty="0" smtClean="0">
+                <a:latin typeface="Arial" panose="020B0604020202020204" pitchFamily="34" charset="0"/>
+                <a:cs typeface="Arial" panose="020B0604020202020204" pitchFamily="34" charset="0"/>
+              </a:rPr>
+              <a:t>entre monomios</a:t>
+            </a:r>
+            <a:endParaRPr lang="es-ES" sz="1000" b="1" dirty="0">
+              <a:latin typeface="Arial" panose="020B0604020202020204" pitchFamily="34" charset="0"/>
+              <a:cs typeface="Arial" panose="020B0604020202020204" pitchFamily="34" charset="0"/>
+            </a:endParaRPr>
+          </a:p>
+        </p:txBody>
+      </p:sp>
+      <p:sp>
+        <p:nvSpPr>
+          <p:cNvPr id="127" name="Rectángulo 126" descr="Nodo de primer nivel" title="Nodo01"/>
+          <p:cNvSpPr/>
+          <p:nvPr/>
+        </p:nvSpPr>
+        <p:spPr>
+          <a:xfrm>
+            <a:off x="7238578" y="2355021"/>
+            <a:ext cx="1124746" cy="439782"/>
+          </a:xfrm>
+          <a:prstGeom prst="rect">
+            <a:avLst/>
+          </a:prstGeom>
+          <a:solidFill>
+            <a:schemeClr val="bg1"/>
+          </a:solidFill>
+          <a:ln>
+            <a:solidFill>
+              <a:schemeClr val="tx1"/>
+            </a:solidFill>
+          </a:ln>
+          <a:effectLst>
+            <a:outerShdw blurRad="50800" dist="38100" dir="2700000" algn="tl" rotWithShape="0">
+              <a:prstClr val="black">
+                <a:alpha val="40000"/>
+              </a:prstClr>
+            </a:outerShdw>
+          </a:effectLst>
+        </p:spPr>
+        <p:style>
+          <a:lnRef idx="2">
+            <a:schemeClr val="accent6"/>
+          </a:lnRef>
+          <a:fillRef idx="1">
+            <a:schemeClr val="lt1"/>
+          </a:fillRef>
+          <a:effectRef idx="0">
+            <a:schemeClr val="accent6"/>
+          </a:effectRef>
+          <a:fontRef idx="minor">
+            <a:schemeClr val="dk1"/>
+          </a:fontRef>
+        </p:style>
+        <p:txBody>
+          <a:bodyPr rtlCol="0" anchor="ctr"/>
+          <a:lstStyle/>
+          <a:p>
+            <a:pPr algn="ctr"/>
+            <a:r>
+              <a:rPr lang="es-ES" sz="1000" b="1" dirty="0" smtClean="0">
+                <a:latin typeface="Arial" panose="020B0604020202020204" pitchFamily="34" charset="0"/>
+                <a:cs typeface="Arial" panose="020B0604020202020204" pitchFamily="34" charset="0"/>
+              </a:rPr>
+              <a:t>entre polinomios</a:t>
+            </a:r>
+            <a:endParaRPr lang="es-ES" sz="1000" b="1" dirty="0">
+              <a:latin typeface="Arial" panose="020B0604020202020204" pitchFamily="34" charset="0"/>
+              <a:cs typeface="Arial" panose="020B0604020202020204" pitchFamily="34" charset="0"/>
+            </a:endParaRPr>
+          </a:p>
+        </p:txBody>
+      </p:sp>
+      <p:cxnSp>
+        <p:nvCxnSpPr>
+          <p:cNvPr id="137" name="Conector angular 136"/>
+          <p:cNvCxnSpPr/>
+          <p:nvPr/>
+        </p:nvCxnSpPr>
+        <p:spPr>
+          <a:xfrm flipH="1" flipV="1">
+            <a:off x="4519144" y="2139437"/>
+            <a:ext cx="3261403" cy="205359"/>
+          </a:xfrm>
+          <a:prstGeom prst="bentConnector3">
+            <a:avLst>
+              <a:gd name="adj1" fmla="val -525"/>
+            </a:avLst>
+          </a:prstGeom>
+          <a:ln w="12700">
+            <a:solidFill>
+              <a:schemeClr val="tx1"/>
+            </a:solidFill>
+          </a:ln>
+        </p:spPr>
+        <p:style>
+          <a:lnRef idx="1">
+            <a:schemeClr val="accent1"/>
+          </a:lnRef>
+          <a:fillRef idx="0">
+            <a:schemeClr val="accent1"/>
+          </a:fillRef>
+          <a:effectRef idx="0">
+            <a:schemeClr val="accent1"/>
+          </a:effectRef>
+          <a:fontRef idx="minor">
+            <a:schemeClr val="tx1"/>
+          </a:fontRef>
+        </p:style>
+      </p:cxnSp>
+      <p:cxnSp>
+        <p:nvCxnSpPr>
+          <p:cNvPr id="140" name="Conector angular 139"/>
+          <p:cNvCxnSpPr/>
+          <p:nvPr/>
+        </p:nvCxnSpPr>
+        <p:spPr>
+          <a:xfrm rot="5400000">
+            <a:off x="4734337" y="1690190"/>
+            <a:ext cx="53240" cy="1"/>
+          </a:xfrm>
+          <a:prstGeom prst="bentConnector3">
+            <a:avLst>
+              <a:gd name="adj1" fmla="val 229219"/>
+            </a:avLst>
+          </a:prstGeom>
+          <a:ln w="12700">
+            <a:solidFill>
+              <a:schemeClr val="tx1"/>
+            </a:solidFill>
+          </a:ln>
+        </p:spPr>
+        <p:style>
+          <a:lnRef idx="1">
+            <a:schemeClr val="accent1"/>
+          </a:lnRef>
+          <a:fillRef idx="0">
+            <a:schemeClr val="accent1"/>
+          </a:fillRef>
+          <a:effectRef idx="0">
+            <a:schemeClr val="accent1"/>
+          </a:effectRef>
+          <a:fontRef idx="minor">
+            <a:schemeClr val="tx1"/>
+          </a:fontRef>
+        </p:style>
+      </p:cxnSp>
+      <p:cxnSp>
+        <p:nvCxnSpPr>
+          <p:cNvPr id="141" name="Conector angular 140"/>
+          <p:cNvCxnSpPr/>
+          <p:nvPr/>
+        </p:nvCxnSpPr>
+        <p:spPr>
+          <a:xfrm rot="5400000">
+            <a:off x="4724974" y="2028740"/>
+            <a:ext cx="53240" cy="1"/>
+          </a:xfrm>
+          <a:prstGeom prst="bentConnector3">
+            <a:avLst>
+              <a:gd name="adj1" fmla="val 229219"/>
+            </a:avLst>
+          </a:prstGeom>
+          <a:ln w="12700">
+            <a:solidFill>
+              <a:schemeClr val="tx1"/>
+            </a:solidFill>
+          </a:ln>
+        </p:spPr>
+        <p:style>
+          <a:lnRef idx="1">
+            <a:schemeClr val="accent1"/>
+          </a:lnRef>
+          <a:fillRef idx="0">
+            <a:schemeClr val="accent1"/>
+          </a:fillRef>
+          <a:effectRef idx="0">
+            <a:schemeClr val="accent1"/>
+          </a:effectRef>
+          <a:fontRef idx="minor">
+            <a:schemeClr val="tx1"/>
+          </a:fontRef>
+        </p:style>
+      </p:cxnSp>
+      <p:sp>
+        <p:nvSpPr>
+          <p:cNvPr id="148" name="Rectángulo 147" descr="Nodo de segundo nivel" title="Nodo02"/>
+          <p:cNvSpPr/>
+          <p:nvPr/>
+        </p:nvSpPr>
+        <p:spPr>
+          <a:xfrm>
+            <a:off x="6381898" y="786579"/>
+            <a:ext cx="856680" cy="357473"/>
+          </a:xfrm>
+          <a:prstGeom prst="rect">
+            <a:avLst/>
+          </a:prstGeom>
+          <a:solidFill>
+            <a:schemeClr val="bg2">
+              <a:lumMod val="50000"/>
+            </a:schemeClr>
+          </a:solidFill>
+          <a:ln>
+            <a:solidFill>
+              <a:schemeClr val="tx1"/>
+            </a:solidFill>
+          </a:ln>
+        </p:spPr>
+        <p:style>
+          <a:lnRef idx="2">
+            <a:schemeClr val="accent6"/>
+          </a:lnRef>
+          <a:fillRef idx="1">
+            <a:schemeClr val="lt1"/>
+          </a:fillRef>
+          <a:effectRef idx="0">
+            <a:schemeClr val="accent6"/>
+          </a:effectRef>
+          <a:fontRef idx="minor">
+            <a:schemeClr val="dk1"/>
+          </a:fontRef>
+        </p:style>
+        <p:txBody>
+          <a:bodyPr rtlCol="0" anchor="ctr"/>
+          <a:lstStyle/>
+          <a:p>
+            <a:pPr algn="ctr"/>
+            <a:r>
+              <a:rPr lang="es-ES" sz="1000" dirty="0" smtClean="0">
+                <a:solidFill>
+                  <a:schemeClr val="bg1"/>
+                </a:solidFill>
+                <a:latin typeface="Arial" panose="020B0604020202020204" pitchFamily="34" charset="0"/>
+                <a:cs typeface="Arial" panose="020B0604020202020204" pitchFamily="34" charset="0"/>
+              </a:rPr>
+              <a:t>Factor común</a:t>
+            </a:r>
+            <a:endParaRPr lang="es-ES" sz="1000" dirty="0">
+              <a:solidFill>
+                <a:schemeClr val="bg1"/>
+              </a:solidFill>
+              <a:latin typeface="Arial" panose="020B0604020202020204" pitchFamily="34" charset="0"/>
+              <a:cs typeface="Arial" panose="020B0604020202020204" pitchFamily="34" charset="0"/>
+            </a:endParaRPr>
+          </a:p>
+        </p:txBody>
+      </p:sp>
+      <p:sp>
+        <p:nvSpPr>
+          <p:cNvPr id="149" name="CuadroTexto 148" descr="Conector entre nodos" title="conector"/>
+          <p:cNvSpPr txBox="1"/>
+          <p:nvPr/>
+        </p:nvSpPr>
+        <p:spPr>
+          <a:xfrm>
+            <a:off x="723027" y="2837038"/>
+            <a:ext cx="1117174" cy="246221"/>
+          </a:xfrm>
+          <a:prstGeom prst="rect">
+            <a:avLst/>
+          </a:prstGeom>
+          <a:noFill/>
+        </p:spPr>
+        <p:txBody>
+          <a:bodyPr wrap="square" rtlCol="0">
+            <a:spAutoFit/>
+          </a:bodyPr>
+          <a:lstStyle/>
+          <a:p>
+            <a:pPr algn="ctr"/>
+            <a:r>
+              <a:rPr lang="es-ES" sz="1000" dirty="0" smtClean="0">
+                <a:latin typeface="Arial" panose="020B0604020202020204" pitchFamily="34" charset="0"/>
+                <a:cs typeface="Arial" panose="020B0604020202020204" pitchFamily="34" charset="0"/>
+              </a:rPr>
+              <a:t>escribiendo</a:t>
+            </a:r>
+            <a:endParaRPr lang="es-ES" sz="1000" dirty="0">
+              <a:latin typeface="Arial" panose="020B0604020202020204" pitchFamily="34" charset="0"/>
+              <a:cs typeface="Arial" panose="020B0604020202020204" pitchFamily="34" charset="0"/>
+            </a:endParaRPr>
+          </a:p>
+        </p:txBody>
+      </p:sp>
+      <p:sp>
+        <p:nvSpPr>
+          <p:cNvPr id="151" name="Rectángulo 150" descr="Nodo de tercer nivel" title="Nodo03"/>
+          <p:cNvSpPr/>
+          <p:nvPr/>
+        </p:nvSpPr>
+        <p:spPr>
+          <a:xfrm>
+            <a:off x="756582" y="3157043"/>
+            <a:ext cx="1023178" cy="518175"/>
+          </a:xfrm>
+          <a:prstGeom prst="rect">
+            <a:avLst/>
+          </a:prstGeom>
+          <a:solidFill>
+            <a:schemeClr val="bg2">
+              <a:lumMod val="90000"/>
+            </a:schemeClr>
+          </a:solidFill>
+          <a:ln>
+            <a:solidFill>
+              <a:schemeClr val="tx1"/>
+            </a:solidFill>
+          </a:ln>
+        </p:spPr>
+        <p:style>
+          <a:lnRef idx="2">
+            <a:schemeClr val="accent6"/>
+          </a:lnRef>
+          <a:fillRef idx="1">
+            <a:schemeClr val="lt1"/>
+          </a:fillRef>
+          <a:effectRef idx="0">
+            <a:schemeClr val="accent6"/>
+          </a:effectRef>
+          <a:fontRef idx="minor">
+            <a:schemeClr val="dk1"/>
+          </a:fontRef>
+        </p:style>
+        <p:txBody>
+          <a:bodyPr rtlCol="0" anchor="ctr"/>
+          <a:lstStyle/>
+          <a:p>
+            <a:pPr algn="ctr"/>
+            <a:r>
+              <a:rPr lang="es-ES" sz="800" dirty="0" smtClean="0">
+                <a:solidFill>
+                  <a:schemeClr val="tx1"/>
+                </a:solidFill>
+                <a:latin typeface="Arial" panose="020B0604020202020204" pitchFamily="34" charset="0"/>
+                <a:cs typeface="Arial" panose="020B0604020202020204" pitchFamily="34" charset="0"/>
+              </a:rPr>
+              <a:t>la expresión como un producto de factores primos</a:t>
+            </a:r>
+            <a:endParaRPr lang="es-ES" sz="800" dirty="0">
+              <a:solidFill>
+                <a:schemeClr val="tx1"/>
+              </a:solidFill>
+              <a:latin typeface="Arial" panose="020B0604020202020204" pitchFamily="34" charset="0"/>
+              <a:cs typeface="Arial" panose="020B0604020202020204" pitchFamily="34" charset="0"/>
+            </a:endParaRPr>
+          </a:p>
+        </p:txBody>
+      </p:sp>
+      <p:cxnSp>
+        <p:nvCxnSpPr>
+          <p:cNvPr id="152" name="Conector angular 151"/>
+          <p:cNvCxnSpPr/>
+          <p:nvPr/>
+        </p:nvCxnSpPr>
+        <p:spPr>
+          <a:xfrm rot="5400000">
+            <a:off x="1232072" y="2828284"/>
+            <a:ext cx="53240" cy="1"/>
+          </a:xfrm>
+          <a:prstGeom prst="bentConnector3">
+            <a:avLst>
+              <a:gd name="adj1" fmla="val 229219"/>
             </a:avLst>
           </a:prstGeom>
           <a:ln w="12700">

</xml_diff>